<commit_message>
chore(assets): update PowerPoint template and Picture0 image
</commit_message>
<xml_diff>
--- a/docs/assets/images/template.pptx
+++ b/docs/assets/images/template.pptx
@@ -5,7 +5,8 @@
     <p:sldMasterId id="2147483660" r:id="rId1"/>
   </p:sldMasterIdLst>
   <p:sldIdLst>
-    <p:sldId id="256" r:id="rId2"/>
+    <p:sldId id="257" r:id="rId2"/>
+    <p:sldId id="258" r:id="rId3"/>
   </p:sldIdLst>
   <p:sldSz cx="25199975" cy="10799763"/>
   <p:notesSz cx="6858000" cy="9144000"/>
@@ -113,6 +114,11 @@
           </p15:clr>
         </p15:guide>
         <p15:guide id="2" pos="7937" userDrawn="1">
+          <p15:clr>
+            <a:srgbClr val="A4A3A4"/>
+          </p15:clr>
+        </p15:guide>
+        <p15:guide id="3" pos="11793" userDrawn="1">
           <p15:clr>
             <a:srgbClr val="A4A3A4"/>
           </p15:clr>
@@ -3040,7 +3046,13 @@
   <p:cSld>
     <p:spTree>
       <p:nvGrpSpPr>
-        <p:cNvPr id="1" name=""/>
+        <p:cNvPr id="1" name="">
+          <a:extLst>
+            <a:ext uri="{FF2B5EF4-FFF2-40B4-BE49-F238E27FC236}">
+              <a16:creationId xmlns:a16="http://schemas.microsoft.com/office/drawing/2014/main" id="{CB31F9FE-BFDC-4FFB-24CF-CF9B46FE1F04}"/>
+            </a:ext>
+          </a:extLst>
+        </p:cNvPr>
         <p:cNvGrpSpPr/>
         <p:nvPr/>
       </p:nvGrpSpPr>
@@ -3057,7 +3069,7 @@
           <p:cNvPr id="14" name="Frame 13">
             <a:extLst>
               <a:ext uri="{FF2B5EF4-FFF2-40B4-BE49-F238E27FC236}">
-                <a16:creationId xmlns:a16="http://schemas.microsoft.com/office/drawing/2014/main" id="{5CB822C3-F84F-5C9A-7986-3FD829B15183}"/>
+                <a16:creationId xmlns:a16="http://schemas.microsoft.com/office/drawing/2014/main" id="{7D7C4824-45DB-65CA-9BD9-517CE407BADE}"/>
               </a:ext>
             </a:extLst>
           </p:cNvPr>
@@ -3071,7 +3083,7 @@
           </a:xfrm>
           <a:prstGeom prst="frame">
             <a:avLst>
-              <a:gd name="adj1" fmla="val 2068"/>
+              <a:gd name="adj1" fmla="val 976"/>
             </a:avLst>
           </a:prstGeom>
           <a:solidFill>
@@ -3113,7 +3125,2896 @@
     </p:spTree>
     <p:extLst>
       <p:ext uri="{BB962C8B-B14F-4D97-AF65-F5344CB8AC3E}">
-        <p14:creationId xmlns:p14="http://schemas.microsoft.com/office/powerpoint/2010/main" val="2344770774"/>
+        <p14:creationId xmlns:p14="http://schemas.microsoft.com/office/powerpoint/2010/main" val="3506641597"/>
+      </p:ext>
+    </p:extLst>
+  </p:cSld>
+  <p:clrMapOvr>
+    <a:masterClrMapping/>
+  </p:clrMapOvr>
+</p:sld>
+</file>
+
+<file path=ppt/slides/slide2.xml><?xml version="1.0" encoding="utf-8"?>
+<p:sld xmlns:a="http://schemas.openxmlformats.org/drawingml/2006/main" xmlns:r="http://schemas.openxmlformats.org/officeDocument/2006/relationships" xmlns:p="http://schemas.openxmlformats.org/presentationml/2006/main">
+  <p:cSld>
+    <p:spTree>
+      <p:nvGrpSpPr>
+        <p:cNvPr id="1" name="">
+          <a:extLst>
+            <a:ext uri="{FF2B5EF4-FFF2-40B4-BE49-F238E27FC236}">
+              <a16:creationId xmlns:a16="http://schemas.microsoft.com/office/drawing/2014/main" id="{A71FAA41-F8F2-948B-13A1-4C5026A0412A}"/>
+            </a:ext>
+          </a:extLst>
+        </p:cNvPr>
+        <p:cNvGrpSpPr/>
+        <p:nvPr/>
+      </p:nvGrpSpPr>
+      <p:grpSpPr>
+        <a:xfrm>
+          <a:off x="0" y="0"/>
+          <a:ext cx="0" cy="0"/>
+          <a:chOff x="0" y="0"/>
+          <a:chExt cx="0" cy="0"/>
+        </a:xfrm>
+      </p:grpSpPr>
+      <p:pic>
+        <p:nvPicPr>
+          <p:cNvPr id="16" name="Graphic 15" descr="Repeat outline">
+            <a:extLst>
+              <a:ext uri="{FF2B5EF4-FFF2-40B4-BE49-F238E27FC236}">
+                <a16:creationId xmlns:a16="http://schemas.microsoft.com/office/drawing/2014/main" id="{3E6B37AC-CD4B-5005-147A-63527BDBC067}"/>
+              </a:ext>
+            </a:extLst>
+          </p:cNvPr>
+          <p:cNvPicPr>
+            <a:picLocks noChangeAspect="1"/>
+          </p:cNvPicPr>
+          <p:nvPr/>
+        </p:nvPicPr>
+        <p:blipFill>
+          <a:blip r:embed="rId2">
+            <a:extLst>
+              <a:ext uri="{96DAC541-7B7A-43D3-8B79-37D633B846F1}">
+                <asvg:svgBlip xmlns:asvg="http://schemas.microsoft.com/office/drawing/2016/SVG/main" r:embed="rId3"/>
+              </a:ext>
+            </a:extLst>
+          </a:blip>
+          <a:stretch>
+            <a:fillRect/>
+          </a:stretch>
+        </p:blipFill>
+        <p:spPr>
+          <a:xfrm>
+            <a:off x="13647146" y="2064747"/>
+            <a:ext cx="3647530" cy="3647530"/>
+          </a:xfrm>
+          <a:prstGeom prst="rect">
+            <a:avLst/>
+          </a:prstGeom>
+        </p:spPr>
+      </p:pic>
+      <p:pic>
+        <p:nvPicPr>
+          <p:cNvPr id="13" name="Graphic 12" descr="Repeat outline">
+            <a:extLst>
+              <a:ext uri="{FF2B5EF4-FFF2-40B4-BE49-F238E27FC236}">
+                <a16:creationId xmlns:a16="http://schemas.microsoft.com/office/drawing/2014/main" id="{AC2F5E33-AA0A-E616-A444-712FF849EEDF}"/>
+              </a:ext>
+            </a:extLst>
+          </p:cNvPr>
+          <p:cNvPicPr>
+            <a:picLocks noChangeAspect="1"/>
+          </p:cNvPicPr>
+          <p:nvPr/>
+        </p:nvPicPr>
+        <p:blipFill>
+          <a:blip r:embed="rId2">
+            <a:extLst>
+              <a:ext uri="{96DAC541-7B7A-43D3-8B79-37D633B846F1}">
+                <asvg:svgBlip xmlns:asvg="http://schemas.microsoft.com/office/drawing/2016/SVG/main" r:embed="rId3"/>
+              </a:ext>
+            </a:extLst>
+          </a:blip>
+          <a:stretch>
+            <a:fillRect/>
+          </a:stretch>
+        </p:blipFill>
+        <p:spPr>
+          <a:xfrm>
+            <a:off x="7905297" y="2064747"/>
+            <a:ext cx="3647530" cy="3647530"/>
+          </a:xfrm>
+          <a:prstGeom prst="rect">
+            <a:avLst/>
+          </a:prstGeom>
+        </p:spPr>
+      </p:pic>
+      <p:sp>
+        <p:nvSpPr>
+          <p:cNvPr id="14" name="Frame 13">
+            <a:extLst>
+              <a:ext uri="{FF2B5EF4-FFF2-40B4-BE49-F238E27FC236}">
+                <a16:creationId xmlns:a16="http://schemas.microsoft.com/office/drawing/2014/main" id="{BF627803-BA77-65F8-0E55-B3B555A69F84}"/>
+              </a:ext>
+            </a:extLst>
+          </p:cNvPr>
+          <p:cNvSpPr/>
+          <p:nvPr/>
+        </p:nvSpPr>
+        <p:spPr>
+          <a:xfrm>
+            <a:off x="0" y="0"/>
+            <a:ext cx="25199975" cy="10799763"/>
+          </a:xfrm>
+          <a:prstGeom prst="frame">
+            <a:avLst>
+              <a:gd name="adj1" fmla="val 703"/>
+            </a:avLst>
+          </a:prstGeom>
+          <a:solidFill>
+            <a:srgbClr val="F7AD2C"/>
+          </a:solidFill>
+          <a:ln>
+            <a:noFill/>
+          </a:ln>
+        </p:spPr>
+        <p:style>
+          <a:lnRef idx="2">
+            <a:schemeClr val="accent1">
+              <a:shade val="15000"/>
+            </a:schemeClr>
+          </a:lnRef>
+          <a:fillRef idx="1">
+            <a:schemeClr val="accent1"/>
+          </a:fillRef>
+          <a:effectRef idx="0">
+            <a:schemeClr val="accent1"/>
+          </a:effectRef>
+          <a:fontRef idx="minor">
+            <a:schemeClr val="lt1"/>
+          </a:fontRef>
+        </p:style>
+        <p:txBody>
+          <a:bodyPr rtlCol="0" anchor="ctr"/>
+          <a:lstStyle/>
+          <a:p>
+            <a:pPr algn="ctr"/>
+            <a:endParaRPr lang="en-NL">
+              <a:solidFill>
+                <a:schemeClr val="tx1"/>
+              </a:solidFill>
+            </a:endParaRPr>
+          </a:p>
+        </p:txBody>
+      </p:sp>
+      <p:sp>
+        <p:nvSpPr>
+          <p:cNvPr id="4" name="Rectangle 3">
+            <a:extLst>
+              <a:ext uri="{FF2B5EF4-FFF2-40B4-BE49-F238E27FC236}">
+                <a16:creationId xmlns:a16="http://schemas.microsoft.com/office/drawing/2014/main" id="{A2806221-7370-959C-8BE6-E524C2F44EB8}"/>
+              </a:ext>
+            </a:extLst>
+          </p:cNvPr>
+          <p:cNvSpPr/>
+          <p:nvPr/>
+        </p:nvSpPr>
+        <p:spPr>
+          <a:xfrm rot="18900000">
+            <a:off x="7699012" y="1858462"/>
+            <a:ext cx="4060100" cy="4060100"/>
+          </a:xfrm>
+          <a:prstGeom prst="rect">
+            <a:avLst/>
+          </a:prstGeom>
+          <a:noFill/>
+          <a:ln w="152400">
+            <a:solidFill>
+              <a:srgbClr val="F7AD2C"/>
+            </a:solidFill>
+          </a:ln>
+        </p:spPr>
+        <p:style>
+          <a:lnRef idx="2">
+            <a:schemeClr val="accent1">
+              <a:shade val="15000"/>
+            </a:schemeClr>
+          </a:lnRef>
+          <a:fillRef idx="1">
+            <a:schemeClr val="accent1"/>
+          </a:fillRef>
+          <a:effectRef idx="0">
+            <a:schemeClr val="accent1"/>
+          </a:effectRef>
+          <a:fontRef idx="minor">
+            <a:schemeClr val="lt1"/>
+          </a:fontRef>
+        </p:style>
+        <p:txBody>
+          <a:bodyPr rtlCol="0" anchor="ctr"/>
+          <a:lstStyle/>
+          <a:p>
+            <a:pPr algn="ctr"/>
+            <a:endParaRPr lang="en-NL"/>
+          </a:p>
+        </p:txBody>
+      </p:sp>
+      <p:sp>
+        <p:nvSpPr>
+          <p:cNvPr id="5" name="Rectangle 4">
+            <a:extLst>
+              <a:ext uri="{FF2B5EF4-FFF2-40B4-BE49-F238E27FC236}">
+                <a16:creationId xmlns:a16="http://schemas.microsoft.com/office/drawing/2014/main" id="{2F280E44-B5D2-8239-8E23-DDA9CA8B72AD}"/>
+              </a:ext>
+            </a:extLst>
+          </p:cNvPr>
+          <p:cNvSpPr/>
+          <p:nvPr/>
+        </p:nvSpPr>
+        <p:spPr>
+          <a:xfrm rot="18900000">
+            <a:off x="13440862" y="1858462"/>
+            <a:ext cx="4060100" cy="4060100"/>
+          </a:xfrm>
+          <a:prstGeom prst="rect">
+            <a:avLst/>
+          </a:prstGeom>
+          <a:noFill/>
+          <a:ln w="152400">
+            <a:solidFill>
+              <a:srgbClr val="F7AD2C"/>
+            </a:solidFill>
+          </a:ln>
+        </p:spPr>
+        <p:style>
+          <a:lnRef idx="2">
+            <a:schemeClr val="accent1">
+              <a:shade val="15000"/>
+            </a:schemeClr>
+          </a:lnRef>
+          <a:fillRef idx="1">
+            <a:schemeClr val="accent1"/>
+          </a:fillRef>
+          <a:effectRef idx="0">
+            <a:schemeClr val="accent1"/>
+          </a:effectRef>
+          <a:fontRef idx="minor">
+            <a:schemeClr val="lt1"/>
+          </a:fontRef>
+        </p:style>
+        <p:txBody>
+          <a:bodyPr rtlCol="0" anchor="ctr"/>
+          <a:lstStyle/>
+          <a:p>
+            <a:pPr algn="ctr"/>
+            <a:endParaRPr lang="en-NL"/>
+          </a:p>
+        </p:txBody>
+      </p:sp>
+      <p:sp>
+        <p:nvSpPr>
+          <p:cNvPr id="2" name="Oval 1">
+            <a:extLst>
+              <a:ext uri="{FF2B5EF4-FFF2-40B4-BE49-F238E27FC236}">
+                <a16:creationId xmlns:a16="http://schemas.microsoft.com/office/drawing/2014/main" id="{43252C76-A153-E0CA-5BC4-288A5427F36D}"/>
+              </a:ext>
+            </a:extLst>
+          </p:cNvPr>
+          <p:cNvSpPr/>
+          <p:nvPr/>
+        </p:nvSpPr>
+        <p:spPr>
+          <a:xfrm>
+            <a:off x="6477063" y="3507439"/>
+            <a:ext cx="762147" cy="762147"/>
+          </a:xfrm>
+          <a:prstGeom prst="ellipse">
+            <a:avLst/>
+          </a:prstGeom>
+          <a:solidFill>
+            <a:srgbClr val="183D76"/>
+          </a:solidFill>
+          <a:ln w="101600">
+            <a:solidFill>
+              <a:srgbClr val="F7AD2C"/>
+            </a:solidFill>
+          </a:ln>
+        </p:spPr>
+        <p:style>
+          <a:lnRef idx="2">
+            <a:schemeClr val="accent1">
+              <a:shade val="15000"/>
+            </a:schemeClr>
+          </a:lnRef>
+          <a:fillRef idx="1">
+            <a:schemeClr val="accent1"/>
+          </a:fillRef>
+          <a:effectRef idx="0">
+            <a:schemeClr val="accent1"/>
+          </a:effectRef>
+          <a:fontRef idx="minor">
+            <a:schemeClr val="lt1"/>
+          </a:fontRef>
+        </p:style>
+        <p:txBody>
+          <a:bodyPr rtlCol="0" anchor="ctr"/>
+          <a:lstStyle/>
+          <a:p>
+            <a:pPr algn="ctr"/>
+            <a:endParaRPr lang="en-NL"/>
+          </a:p>
+        </p:txBody>
+      </p:sp>
+      <p:sp>
+        <p:nvSpPr>
+          <p:cNvPr id="6" name="Oval 5">
+            <a:extLst>
+              <a:ext uri="{FF2B5EF4-FFF2-40B4-BE49-F238E27FC236}">
+                <a16:creationId xmlns:a16="http://schemas.microsoft.com/office/drawing/2014/main" id="{79FA743E-3C5C-D9C6-96DB-F0F9D90F417C}"/>
+              </a:ext>
+            </a:extLst>
+          </p:cNvPr>
+          <p:cNvSpPr/>
+          <p:nvPr/>
+        </p:nvSpPr>
+        <p:spPr>
+          <a:xfrm>
+            <a:off x="12218913" y="3507439"/>
+            <a:ext cx="762147" cy="762147"/>
+          </a:xfrm>
+          <a:prstGeom prst="ellipse">
+            <a:avLst/>
+          </a:prstGeom>
+          <a:solidFill>
+            <a:srgbClr val="183D76"/>
+          </a:solidFill>
+          <a:ln w="101600">
+            <a:solidFill>
+              <a:srgbClr val="F7AD2C"/>
+            </a:solidFill>
+          </a:ln>
+        </p:spPr>
+        <p:style>
+          <a:lnRef idx="2">
+            <a:schemeClr val="accent1">
+              <a:shade val="15000"/>
+            </a:schemeClr>
+          </a:lnRef>
+          <a:fillRef idx="1">
+            <a:schemeClr val="accent1"/>
+          </a:fillRef>
+          <a:effectRef idx="0">
+            <a:schemeClr val="accent1"/>
+          </a:effectRef>
+          <a:fontRef idx="minor">
+            <a:schemeClr val="lt1"/>
+          </a:fontRef>
+        </p:style>
+        <p:txBody>
+          <a:bodyPr rtlCol="0" anchor="ctr"/>
+          <a:lstStyle/>
+          <a:p>
+            <a:pPr algn="ctr"/>
+            <a:endParaRPr lang="en-NL"/>
+          </a:p>
+        </p:txBody>
+      </p:sp>
+      <p:sp>
+        <p:nvSpPr>
+          <p:cNvPr id="7" name="Oval 6">
+            <a:extLst>
+              <a:ext uri="{FF2B5EF4-FFF2-40B4-BE49-F238E27FC236}">
+                <a16:creationId xmlns:a16="http://schemas.microsoft.com/office/drawing/2014/main" id="{491BC9C1-7078-FB45-98F0-EBF65707B0FE}"/>
+              </a:ext>
+            </a:extLst>
+          </p:cNvPr>
+          <p:cNvSpPr/>
+          <p:nvPr/>
+        </p:nvSpPr>
+        <p:spPr>
+          <a:xfrm>
+            <a:off x="17960763" y="3507439"/>
+            <a:ext cx="762147" cy="762147"/>
+          </a:xfrm>
+          <a:prstGeom prst="ellipse">
+            <a:avLst/>
+          </a:prstGeom>
+          <a:solidFill>
+            <a:srgbClr val="183D76"/>
+          </a:solidFill>
+          <a:ln w="101600">
+            <a:solidFill>
+              <a:srgbClr val="F7AD2C"/>
+            </a:solidFill>
+          </a:ln>
+        </p:spPr>
+        <p:style>
+          <a:lnRef idx="2">
+            <a:schemeClr val="accent1">
+              <a:shade val="15000"/>
+            </a:schemeClr>
+          </a:lnRef>
+          <a:fillRef idx="1">
+            <a:schemeClr val="accent1"/>
+          </a:fillRef>
+          <a:effectRef idx="0">
+            <a:schemeClr val="accent1"/>
+          </a:effectRef>
+          <a:fontRef idx="minor">
+            <a:schemeClr val="lt1"/>
+          </a:fontRef>
+        </p:style>
+        <p:txBody>
+          <a:bodyPr rtlCol="0" anchor="ctr"/>
+          <a:lstStyle/>
+          <a:p>
+            <a:pPr algn="ctr"/>
+            <a:endParaRPr lang="en-NL"/>
+          </a:p>
+        </p:txBody>
+      </p:sp>
+      <p:sp>
+        <p:nvSpPr>
+          <p:cNvPr id="8" name="TextBox 7">
+            <a:extLst>
+              <a:ext uri="{FF2B5EF4-FFF2-40B4-BE49-F238E27FC236}">
+                <a16:creationId xmlns:a16="http://schemas.microsoft.com/office/drawing/2014/main" id="{F4AFEC41-9B71-0F4F-DC66-8CE4B1A16BA1}"/>
+              </a:ext>
+            </a:extLst>
+          </p:cNvPr>
+          <p:cNvSpPr txBox="1"/>
+          <p:nvPr/>
+        </p:nvSpPr>
+        <p:spPr>
+          <a:xfrm>
+            <a:off x="7325821" y="3596125"/>
+            <a:ext cx="2173031" cy="584775"/>
+          </a:xfrm>
+          <a:prstGeom prst="rect">
+            <a:avLst/>
+          </a:prstGeom>
+          <a:noFill/>
+        </p:spPr>
+        <p:txBody>
+          <a:bodyPr wrap="none" rtlCol="0">
+            <a:spAutoFit/>
+          </a:bodyPr>
+          <a:lstStyle/>
+          <a:p>
+            <a:r>
+              <a:rPr lang="en-US" sz="3200" b="1" dirty="0">
+                <a:solidFill>
+                  <a:srgbClr val="183D76"/>
+                </a:solidFill>
+              </a:rPr>
+              <a:t>DISCOVER</a:t>
+            </a:r>
+            <a:endParaRPr lang="en-NL" sz="3200" b="1" dirty="0">
+              <a:solidFill>
+                <a:srgbClr val="183D76"/>
+              </a:solidFill>
+            </a:endParaRPr>
+          </a:p>
+        </p:txBody>
+      </p:sp>
+      <p:sp>
+        <p:nvSpPr>
+          <p:cNvPr id="9" name="TextBox 8">
+            <a:extLst>
+              <a:ext uri="{FF2B5EF4-FFF2-40B4-BE49-F238E27FC236}">
+                <a16:creationId xmlns:a16="http://schemas.microsoft.com/office/drawing/2014/main" id="{B71B7438-0254-3AB1-A3A6-45C8913A63DA}"/>
+              </a:ext>
+            </a:extLst>
+          </p:cNvPr>
+          <p:cNvSpPr txBox="1"/>
+          <p:nvPr/>
+        </p:nvSpPr>
+        <p:spPr>
+          <a:xfrm>
+            <a:off x="10570928" y="3596125"/>
+            <a:ext cx="1582484" cy="584775"/>
+          </a:xfrm>
+          <a:prstGeom prst="rect">
+            <a:avLst/>
+          </a:prstGeom>
+          <a:noFill/>
+        </p:spPr>
+        <p:txBody>
+          <a:bodyPr wrap="none" rtlCol="0">
+            <a:spAutoFit/>
+          </a:bodyPr>
+          <a:lstStyle/>
+          <a:p>
+            <a:r>
+              <a:rPr lang="en-US" sz="3200" b="1" dirty="0">
+                <a:solidFill>
+                  <a:srgbClr val="183D76"/>
+                </a:solidFill>
+              </a:rPr>
+              <a:t>DEFINE</a:t>
+            </a:r>
+            <a:endParaRPr lang="en-NL" sz="3200" b="1" dirty="0">
+              <a:solidFill>
+                <a:srgbClr val="183D76"/>
+              </a:solidFill>
+            </a:endParaRPr>
+          </a:p>
+        </p:txBody>
+      </p:sp>
+      <p:sp>
+        <p:nvSpPr>
+          <p:cNvPr id="10" name="TextBox 9">
+            <a:extLst>
+              <a:ext uri="{FF2B5EF4-FFF2-40B4-BE49-F238E27FC236}">
+                <a16:creationId xmlns:a16="http://schemas.microsoft.com/office/drawing/2014/main" id="{3AC809AD-41DD-D047-59D7-13C06AAF45FC}"/>
+              </a:ext>
+            </a:extLst>
+          </p:cNvPr>
+          <p:cNvSpPr txBox="1"/>
+          <p:nvPr/>
+        </p:nvSpPr>
+        <p:spPr>
+          <a:xfrm>
+            <a:off x="13053144" y="3596125"/>
+            <a:ext cx="1950149" cy="584775"/>
+          </a:xfrm>
+          <a:prstGeom prst="rect">
+            <a:avLst/>
+          </a:prstGeom>
+          <a:noFill/>
+        </p:spPr>
+        <p:txBody>
+          <a:bodyPr wrap="none" rtlCol="0">
+            <a:spAutoFit/>
+          </a:bodyPr>
+          <a:lstStyle/>
+          <a:p>
+            <a:r>
+              <a:rPr lang="en-US" sz="3200" b="1" dirty="0">
+                <a:solidFill>
+                  <a:srgbClr val="183D76"/>
+                </a:solidFill>
+              </a:rPr>
+              <a:t>DEVELOP</a:t>
+            </a:r>
+            <a:endParaRPr lang="en-NL" sz="3200" b="1" dirty="0">
+              <a:solidFill>
+                <a:srgbClr val="183D76"/>
+              </a:solidFill>
+            </a:endParaRPr>
+          </a:p>
+        </p:txBody>
+      </p:sp>
+      <p:sp>
+        <p:nvSpPr>
+          <p:cNvPr id="11" name="TextBox 10">
+            <a:extLst>
+              <a:ext uri="{FF2B5EF4-FFF2-40B4-BE49-F238E27FC236}">
+                <a16:creationId xmlns:a16="http://schemas.microsoft.com/office/drawing/2014/main" id="{FEB0C9E4-7BE4-9F68-2678-02225E489293}"/>
+              </a:ext>
+            </a:extLst>
+          </p:cNvPr>
+          <p:cNvSpPr txBox="1"/>
+          <p:nvPr/>
+        </p:nvSpPr>
+        <p:spPr>
+          <a:xfrm>
+            <a:off x="16105990" y="3596125"/>
+            <a:ext cx="1789272" cy="584775"/>
+          </a:xfrm>
+          <a:prstGeom prst="rect">
+            <a:avLst/>
+          </a:prstGeom>
+          <a:noFill/>
+        </p:spPr>
+        <p:txBody>
+          <a:bodyPr wrap="none" rtlCol="0">
+            <a:spAutoFit/>
+          </a:bodyPr>
+          <a:lstStyle/>
+          <a:p>
+            <a:r>
+              <a:rPr lang="en-US" sz="3200" b="1" dirty="0">
+                <a:solidFill>
+                  <a:srgbClr val="183D76"/>
+                </a:solidFill>
+              </a:rPr>
+              <a:t>DELIVER</a:t>
+            </a:r>
+            <a:endParaRPr lang="en-NL" sz="3200" b="1" dirty="0">
+              <a:solidFill>
+                <a:srgbClr val="183D76"/>
+              </a:solidFill>
+            </a:endParaRPr>
+          </a:p>
+        </p:txBody>
+      </p:sp>
+      <p:cxnSp>
+        <p:nvCxnSpPr>
+          <p:cNvPr id="18" name="Straight Connector 17">
+            <a:extLst>
+              <a:ext uri="{FF2B5EF4-FFF2-40B4-BE49-F238E27FC236}">
+                <a16:creationId xmlns:a16="http://schemas.microsoft.com/office/drawing/2014/main" id="{4546DE2D-6A36-16DA-431A-E59A1B892720}"/>
+              </a:ext>
+            </a:extLst>
+          </p:cNvPr>
+          <p:cNvCxnSpPr>
+            <a:cxnSpLocks/>
+          </p:cNvCxnSpPr>
+          <p:nvPr/>
+        </p:nvCxnSpPr>
+        <p:spPr>
+          <a:xfrm>
+            <a:off x="6858136" y="2598921"/>
+            <a:ext cx="0" cy="895350"/>
+          </a:xfrm>
+          <a:prstGeom prst="line">
+            <a:avLst/>
+          </a:prstGeom>
+          <a:ln w="76200">
+            <a:solidFill>
+              <a:srgbClr val="183D76"/>
+            </a:solidFill>
+          </a:ln>
+        </p:spPr>
+        <p:style>
+          <a:lnRef idx="2">
+            <a:schemeClr val="accent1"/>
+          </a:lnRef>
+          <a:fillRef idx="0">
+            <a:schemeClr val="accent1"/>
+          </a:fillRef>
+          <a:effectRef idx="1">
+            <a:schemeClr val="accent1"/>
+          </a:effectRef>
+          <a:fontRef idx="minor">
+            <a:schemeClr val="tx1"/>
+          </a:fontRef>
+        </p:style>
+      </p:cxnSp>
+      <p:cxnSp>
+        <p:nvCxnSpPr>
+          <p:cNvPr id="19" name="Straight Connector 18">
+            <a:extLst>
+              <a:ext uri="{FF2B5EF4-FFF2-40B4-BE49-F238E27FC236}">
+                <a16:creationId xmlns:a16="http://schemas.microsoft.com/office/drawing/2014/main" id="{FB38FDD3-F981-9E35-CE7B-ABC1342256DF}"/>
+              </a:ext>
+            </a:extLst>
+          </p:cNvPr>
+          <p:cNvCxnSpPr>
+            <a:cxnSpLocks/>
+          </p:cNvCxnSpPr>
+          <p:nvPr/>
+        </p:nvCxnSpPr>
+        <p:spPr>
+          <a:xfrm>
+            <a:off x="12599986" y="2598921"/>
+            <a:ext cx="0" cy="895350"/>
+          </a:xfrm>
+          <a:prstGeom prst="line">
+            <a:avLst/>
+          </a:prstGeom>
+          <a:ln w="76200">
+            <a:solidFill>
+              <a:srgbClr val="183D76"/>
+            </a:solidFill>
+          </a:ln>
+        </p:spPr>
+        <p:style>
+          <a:lnRef idx="2">
+            <a:schemeClr val="accent1"/>
+          </a:lnRef>
+          <a:fillRef idx="0">
+            <a:schemeClr val="accent1"/>
+          </a:fillRef>
+          <a:effectRef idx="1">
+            <a:schemeClr val="accent1"/>
+          </a:effectRef>
+          <a:fontRef idx="minor">
+            <a:schemeClr val="tx1"/>
+          </a:fontRef>
+        </p:style>
+      </p:cxnSp>
+      <p:cxnSp>
+        <p:nvCxnSpPr>
+          <p:cNvPr id="20" name="Straight Connector 19">
+            <a:extLst>
+              <a:ext uri="{FF2B5EF4-FFF2-40B4-BE49-F238E27FC236}">
+                <a16:creationId xmlns:a16="http://schemas.microsoft.com/office/drawing/2014/main" id="{C12B5706-CD2E-A7C1-912E-D61BCDFE64B0}"/>
+              </a:ext>
+            </a:extLst>
+          </p:cNvPr>
+          <p:cNvCxnSpPr>
+            <a:cxnSpLocks/>
+          </p:cNvCxnSpPr>
+          <p:nvPr/>
+        </p:nvCxnSpPr>
+        <p:spPr>
+          <a:xfrm>
+            <a:off x="18341831" y="2598921"/>
+            <a:ext cx="0" cy="895350"/>
+          </a:xfrm>
+          <a:prstGeom prst="line">
+            <a:avLst/>
+          </a:prstGeom>
+          <a:ln w="76200">
+            <a:solidFill>
+              <a:srgbClr val="183D76"/>
+            </a:solidFill>
+          </a:ln>
+        </p:spPr>
+        <p:style>
+          <a:lnRef idx="2">
+            <a:schemeClr val="accent1"/>
+          </a:lnRef>
+          <a:fillRef idx="0">
+            <a:schemeClr val="accent1"/>
+          </a:fillRef>
+          <a:effectRef idx="1">
+            <a:schemeClr val="accent1"/>
+          </a:effectRef>
+          <a:fontRef idx="minor">
+            <a:schemeClr val="tx1"/>
+          </a:fontRef>
+        </p:style>
+      </p:cxnSp>
+      <p:sp>
+        <p:nvSpPr>
+          <p:cNvPr id="21" name="TextBox 20">
+            <a:extLst>
+              <a:ext uri="{FF2B5EF4-FFF2-40B4-BE49-F238E27FC236}">
+                <a16:creationId xmlns:a16="http://schemas.microsoft.com/office/drawing/2014/main" id="{ECF618C6-9325-93C7-E978-C7ECED829284}"/>
+              </a:ext>
+            </a:extLst>
+          </p:cNvPr>
+          <p:cNvSpPr txBox="1"/>
+          <p:nvPr/>
+        </p:nvSpPr>
+        <p:spPr>
+          <a:xfrm>
+            <a:off x="6015506" y="2018581"/>
+            <a:ext cx="1680204" cy="584775"/>
+          </a:xfrm>
+          <a:prstGeom prst="rect">
+            <a:avLst/>
+          </a:prstGeom>
+          <a:noFill/>
+        </p:spPr>
+        <p:txBody>
+          <a:bodyPr wrap="none" rtlCol="0">
+            <a:spAutoFit/>
+          </a:bodyPr>
+          <a:lstStyle/>
+          <a:p>
+            <a:r>
+              <a:rPr lang="en-US" sz="3200" dirty="0">
+                <a:solidFill>
+                  <a:srgbClr val="183D76"/>
+                </a:solidFill>
+              </a:rPr>
+              <a:t>Problem</a:t>
+            </a:r>
+            <a:endParaRPr lang="en-NL" sz="3200" dirty="0">
+              <a:solidFill>
+                <a:srgbClr val="183D76"/>
+              </a:solidFill>
+            </a:endParaRPr>
+          </a:p>
+        </p:txBody>
+      </p:sp>
+      <p:sp>
+        <p:nvSpPr>
+          <p:cNvPr id="22" name="TextBox 21">
+            <a:extLst>
+              <a:ext uri="{FF2B5EF4-FFF2-40B4-BE49-F238E27FC236}">
+                <a16:creationId xmlns:a16="http://schemas.microsoft.com/office/drawing/2014/main" id="{73AF6347-E31B-886A-D969-7CAC74ACB961}"/>
+              </a:ext>
+            </a:extLst>
+          </p:cNvPr>
+          <p:cNvSpPr txBox="1"/>
+          <p:nvPr/>
+        </p:nvSpPr>
+        <p:spPr>
+          <a:xfrm>
+            <a:off x="11663685" y="1526138"/>
+            <a:ext cx="1859805" cy="1077218"/>
+          </a:xfrm>
+          <a:prstGeom prst="rect">
+            <a:avLst/>
+          </a:prstGeom>
+          <a:noFill/>
+        </p:spPr>
+        <p:txBody>
+          <a:bodyPr wrap="none" rtlCol="0">
+            <a:spAutoFit/>
+          </a:bodyPr>
+          <a:lstStyle/>
+          <a:p>
+            <a:pPr algn="ctr"/>
+            <a:r>
+              <a:rPr lang="en-US" sz="3200" dirty="0">
+                <a:solidFill>
+                  <a:srgbClr val="183D76"/>
+                </a:solidFill>
+              </a:rPr>
+              <a:t>Problem</a:t>
+            </a:r>
+          </a:p>
+          <a:p>
+            <a:pPr algn="ctr"/>
+            <a:r>
+              <a:rPr lang="en-US" sz="3200" dirty="0">
+                <a:solidFill>
+                  <a:srgbClr val="183D76"/>
+                </a:solidFill>
+              </a:rPr>
+              <a:t>definition</a:t>
+            </a:r>
+            <a:endParaRPr lang="en-NL" sz="3200" dirty="0">
+              <a:solidFill>
+                <a:srgbClr val="183D76"/>
+              </a:solidFill>
+            </a:endParaRPr>
+          </a:p>
+        </p:txBody>
+      </p:sp>
+      <p:sp>
+        <p:nvSpPr>
+          <p:cNvPr id="23" name="TextBox 22">
+            <a:extLst>
+              <a:ext uri="{FF2B5EF4-FFF2-40B4-BE49-F238E27FC236}">
+                <a16:creationId xmlns:a16="http://schemas.microsoft.com/office/drawing/2014/main" id="{FED79ECA-F0D9-D9F1-F22B-561C2830BAA4}"/>
+              </a:ext>
+            </a:extLst>
+          </p:cNvPr>
+          <p:cNvSpPr txBox="1"/>
+          <p:nvPr/>
+        </p:nvSpPr>
+        <p:spPr>
+          <a:xfrm>
+            <a:off x="17510514" y="1995894"/>
+            <a:ext cx="1662635" cy="584775"/>
+          </a:xfrm>
+          <a:prstGeom prst="rect">
+            <a:avLst/>
+          </a:prstGeom>
+          <a:noFill/>
+        </p:spPr>
+        <p:txBody>
+          <a:bodyPr wrap="none" rtlCol="0">
+            <a:spAutoFit/>
+          </a:bodyPr>
+          <a:lstStyle/>
+          <a:p>
+            <a:pPr algn="ctr"/>
+            <a:r>
+              <a:rPr lang="en-US" sz="3200" dirty="0">
+                <a:solidFill>
+                  <a:srgbClr val="183D76"/>
+                </a:solidFill>
+              </a:rPr>
+              <a:t>Solution</a:t>
+            </a:r>
+            <a:endParaRPr lang="en-NL" sz="3200" dirty="0">
+              <a:solidFill>
+                <a:srgbClr val="183D76"/>
+              </a:solidFill>
+            </a:endParaRPr>
+          </a:p>
+        </p:txBody>
+      </p:sp>
+      <p:sp>
+        <p:nvSpPr>
+          <p:cNvPr id="24" name="TextBox 23">
+            <a:extLst>
+              <a:ext uri="{FF2B5EF4-FFF2-40B4-BE49-F238E27FC236}">
+                <a16:creationId xmlns:a16="http://schemas.microsoft.com/office/drawing/2014/main" id="{36DB62F3-7D65-6A8F-58EB-1EC3241FC764}"/>
+              </a:ext>
+            </a:extLst>
+          </p:cNvPr>
+          <p:cNvSpPr txBox="1"/>
+          <p:nvPr/>
+        </p:nvSpPr>
+        <p:spPr>
+          <a:xfrm rot="2700000">
+            <a:off x="6306784" y="5488843"/>
+            <a:ext cx="3325654" cy="461665"/>
+          </a:xfrm>
+          <a:prstGeom prst="rect">
+            <a:avLst/>
+          </a:prstGeom>
+          <a:noFill/>
+        </p:spPr>
+        <p:txBody>
+          <a:bodyPr wrap="none" rtlCol="0">
+            <a:spAutoFit/>
+          </a:bodyPr>
+          <a:lstStyle/>
+          <a:p>
+            <a:r>
+              <a:rPr lang="en-US" sz="2400" dirty="0">
+                <a:solidFill>
+                  <a:srgbClr val="183D76"/>
+                </a:solidFill>
+              </a:rPr>
+              <a:t>Insight into the problem</a:t>
+            </a:r>
+            <a:endParaRPr lang="en-NL" sz="2400" dirty="0">
+              <a:solidFill>
+                <a:srgbClr val="183D76"/>
+              </a:solidFill>
+            </a:endParaRPr>
+          </a:p>
+        </p:txBody>
+      </p:sp>
+      <p:sp>
+        <p:nvSpPr>
+          <p:cNvPr id="25" name="TextBox 24">
+            <a:extLst>
+              <a:ext uri="{FF2B5EF4-FFF2-40B4-BE49-F238E27FC236}">
+                <a16:creationId xmlns:a16="http://schemas.microsoft.com/office/drawing/2014/main" id="{6E2346D6-E8CD-2670-9D7F-45876A7BB652}"/>
+              </a:ext>
+            </a:extLst>
+          </p:cNvPr>
+          <p:cNvSpPr txBox="1"/>
+          <p:nvPr/>
+        </p:nvSpPr>
+        <p:spPr>
+          <a:xfrm rot="2700000">
+            <a:off x="12358986" y="5488843"/>
+            <a:ext cx="2662717" cy="461665"/>
+          </a:xfrm>
+          <a:prstGeom prst="rect">
+            <a:avLst/>
+          </a:prstGeom>
+          <a:noFill/>
+        </p:spPr>
+        <p:txBody>
+          <a:bodyPr wrap="none" rtlCol="0">
+            <a:spAutoFit/>
+          </a:bodyPr>
+          <a:lstStyle/>
+          <a:p>
+            <a:r>
+              <a:rPr lang="en-US" sz="2400" dirty="0">
+                <a:solidFill>
+                  <a:srgbClr val="183D76"/>
+                </a:solidFill>
+              </a:rPr>
+              <a:t>Potential solutions</a:t>
+            </a:r>
+            <a:endParaRPr lang="en-NL" sz="2400" dirty="0">
+              <a:solidFill>
+                <a:srgbClr val="183D76"/>
+              </a:solidFill>
+            </a:endParaRPr>
+          </a:p>
+        </p:txBody>
+      </p:sp>
+      <p:sp>
+        <p:nvSpPr>
+          <p:cNvPr id="26" name="TextBox 25">
+            <a:extLst>
+              <a:ext uri="{FF2B5EF4-FFF2-40B4-BE49-F238E27FC236}">
+                <a16:creationId xmlns:a16="http://schemas.microsoft.com/office/drawing/2014/main" id="{E3D44C7C-2F94-0FA5-017C-5DB87FF61B17}"/>
+              </a:ext>
+            </a:extLst>
+          </p:cNvPr>
+          <p:cNvSpPr txBox="1"/>
+          <p:nvPr/>
+        </p:nvSpPr>
+        <p:spPr>
+          <a:xfrm rot="18900000">
+            <a:off x="10181707" y="5488843"/>
+            <a:ext cx="2623923" cy="461665"/>
+          </a:xfrm>
+          <a:prstGeom prst="rect">
+            <a:avLst/>
+          </a:prstGeom>
+          <a:noFill/>
+        </p:spPr>
+        <p:txBody>
+          <a:bodyPr wrap="none" rtlCol="0">
+            <a:spAutoFit/>
+          </a:bodyPr>
+          <a:lstStyle/>
+          <a:p>
+            <a:r>
+              <a:rPr lang="en-US" sz="2400" dirty="0">
+                <a:solidFill>
+                  <a:srgbClr val="183D76"/>
+                </a:solidFill>
+              </a:rPr>
+              <a:t>Scope down focus</a:t>
+            </a:r>
+            <a:endParaRPr lang="en-NL" sz="2400" dirty="0">
+              <a:solidFill>
+                <a:srgbClr val="183D76"/>
+              </a:solidFill>
+            </a:endParaRPr>
+          </a:p>
+        </p:txBody>
+      </p:sp>
+      <p:sp>
+        <p:nvSpPr>
+          <p:cNvPr id="27" name="TextBox 26">
+            <a:extLst>
+              <a:ext uri="{FF2B5EF4-FFF2-40B4-BE49-F238E27FC236}">
+                <a16:creationId xmlns:a16="http://schemas.microsoft.com/office/drawing/2014/main" id="{089AE679-9484-6DFC-0ADE-3361286099B0}"/>
+              </a:ext>
+            </a:extLst>
+          </p:cNvPr>
+          <p:cNvSpPr txBox="1"/>
+          <p:nvPr/>
+        </p:nvSpPr>
+        <p:spPr>
+          <a:xfrm rot="18900000">
+            <a:off x="15875407" y="5488843"/>
+            <a:ext cx="2737352" cy="461665"/>
+          </a:xfrm>
+          <a:prstGeom prst="rect">
+            <a:avLst/>
+          </a:prstGeom>
+          <a:noFill/>
+        </p:spPr>
+        <p:txBody>
+          <a:bodyPr wrap="none" rtlCol="0">
+            <a:spAutoFit/>
+          </a:bodyPr>
+          <a:lstStyle/>
+          <a:p>
+            <a:r>
+              <a:rPr lang="en-US" sz="2400" dirty="0">
+                <a:solidFill>
+                  <a:srgbClr val="183D76"/>
+                </a:solidFill>
+              </a:rPr>
+              <a:t>Solutions that work</a:t>
+            </a:r>
+            <a:endParaRPr lang="en-NL" sz="2400" dirty="0">
+              <a:solidFill>
+                <a:srgbClr val="183D76"/>
+              </a:solidFill>
+            </a:endParaRPr>
+          </a:p>
+        </p:txBody>
+      </p:sp>
+      <p:graphicFrame>
+        <p:nvGraphicFramePr>
+          <p:cNvPr id="33" name="Table 32">
+            <a:extLst>
+              <a:ext uri="{FF2B5EF4-FFF2-40B4-BE49-F238E27FC236}">
+                <a16:creationId xmlns:a16="http://schemas.microsoft.com/office/drawing/2014/main" id="{C5267497-635D-7784-A6C7-A94EF1AF5A72}"/>
+              </a:ext>
+            </a:extLst>
+          </p:cNvPr>
+          <p:cNvGraphicFramePr>
+            <a:graphicFrameLocks noGrp="1"/>
+          </p:cNvGraphicFramePr>
+          <p:nvPr>
+            <p:extLst>
+              <p:ext uri="{D42A27DB-BD31-4B8C-83A1-F6EECF244321}">
+                <p14:modId xmlns:p14="http://schemas.microsoft.com/office/powerpoint/2010/main" val="654227365"/>
+              </p:ext>
+            </p:extLst>
+          </p:nvPr>
+        </p:nvGraphicFramePr>
+        <p:xfrm>
+          <a:off x="6477063" y="7103800"/>
+          <a:ext cx="12244324" cy="3205563"/>
+        </p:xfrm>
+        <a:graphic>
+          <a:graphicData uri="http://schemas.openxmlformats.org/drawingml/2006/table">
+            <a:tbl>
+              <a:tblPr/>
+              <a:tblGrid>
+                <a:gridCol w="3061081">
+                  <a:extLst>
+                    <a:ext uri="{9D8B030D-6E8A-4147-A177-3AD203B41FA5}">
+                      <a16:colId xmlns:a16="http://schemas.microsoft.com/office/drawing/2014/main" val="3991067095"/>
+                    </a:ext>
+                  </a:extLst>
+                </a:gridCol>
+                <a:gridCol w="3061081">
+                  <a:extLst>
+                    <a:ext uri="{9D8B030D-6E8A-4147-A177-3AD203B41FA5}">
+                      <a16:colId xmlns:a16="http://schemas.microsoft.com/office/drawing/2014/main" val="531237246"/>
+                    </a:ext>
+                  </a:extLst>
+                </a:gridCol>
+                <a:gridCol w="3061081">
+                  <a:extLst>
+                    <a:ext uri="{9D8B030D-6E8A-4147-A177-3AD203B41FA5}">
+                      <a16:colId xmlns:a16="http://schemas.microsoft.com/office/drawing/2014/main" val="3766330911"/>
+                    </a:ext>
+                  </a:extLst>
+                </a:gridCol>
+                <a:gridCol w="3061081">
+                  <a:extLst>
+                    <a:ext uri="{9D8B030D-6E8A-4147-A177-3AD203B41FA5}">
+                      <a16:colId xmlns:a16="http://schemas.microsoft.com/office/drawing/2014/main" val="2198907922"/>
+                    </a:ext>
+                  </a:extLst>
+                </a:gridCol>
+              </a:tblGrid>
+              <a:tr h="752681">
+                <a:tc>
+                  <a:txBody>
+                    <a:bodyPr/>
+                    <a:lstStyle/>
+                    <a:p>
+                      <a:pPr algn="l" fontAlgn="b">
+                        <a:spcBef>
+                          <a:spcPts val="0"/>
+                        </a:spcBef>
+                        <a:spcAft>
+                          <a:spcPts val="0"/>
+                        </a:spcAft>
+                      </a:pPr>
+                      <a:r>
+                        <a:rPr lang="en-US" sz="2400" b="1" i="0" u="none" strike="noStrike" dirty="0">
+                          <a:solidFill>
+                            <a:schemeClr val="bg1">
+                              <a:lumMod val="50000"/>
+                            </a:schemeClr>
+                          </a:solidFill>
+                          <a:effectLst/>
+                          <a:latin typeface="Aptos Narrow" panose="020B0004020202020204" pitchFamily="34" charset="0"/>
+                        </a:rPr>
+                        <a:t>Example mappings</a:t>
+                      </a:r>
+                    </a:p>
+                  </a:txBody>
+                  <a:tcPr marL="144000" marR="54000" marT="108000" marB="108000">
+                    <a:lnL w="12700" cap="flat" cmpd="sng" algn="ctr">
+                      <a:noFill/>
+                      <a:prstDash val="solid"/>
+                      <a:round/>
+                      <a:headEnd type="none" w="med" len="med"/>
+                      <a:tailEnd type="none" w="med" len="med"/>
+                    </a:lnL>
+                    <a:lnR w="12700" cap="flat" cmpd="sng" algn="ctr">
+                      <a:noFill/>
+                      <a:prstDash val="solid"/>
+                      <a:round/>
+                      <a:headEnd type="none" w="med" len="med"/>
+                      <a:tailEnd type="none" w="med" len="med"/>
+                    </a:lnR>
+                    <a:lnT w="12700" cap="flat" cmpd="sng" algn="ctr">
+                      <a:noFill/>
+                      <a:prstDash val="solid"/>
+                      <a:round/>
+                      <a:headEnd type="none" w="med" len="med"/>
+                      <a:tailEnd type="none" w="med" len="med"/>
+                    </a:lnT>
+                    <a:lnB w="12700" cap="flat" cmpd="sng" algn="ctr">
+                      <a:noFill/>
+                      <a:prstDash val="solid"/>
+                      <a:round/>
+                      <a:headEnd type="none" w="med" len="med"/>
+                      <a:tailEnd type="none" w="med" len="med"/>
+                    </a:lnB>
+                    <a:lnTlToBr w="12700" cmpd="sng">
+                      <a:noFill/>
+                      <a:prstDash val="solid"/>
+                    </a:lnTlToBr>
+                    <a:lnBlToTr w="12700" cmpd="sng">
+                      <a:noFill/>
+                      <a:prstDash val="solid"/>
+                    </a:lnBlToTr>
+                    <a:noFill/>
+                  </a:tcPr>
+                </a:tc>
+                <a:tc>
+                  <a:txBody>
+                    <a:bodyPr/>
+                    <a:lstStyle/>
+                    <a:p>
+                      <a:pPr algn="l" fontAlgn="b">
+                        <a:spcBef>
+                          <a:spcPts val="0"/>
+                        </a:spcBef>
+                        <a:spcAft>
+                          <a:spcPts val="0"/>
+                        </a:spcAft>
+                      </a:pPr>
+                      <a:r>
+                        <a:rPr lang="en-US" sz="2400" b="1" i="0" u="none" strike="noStrike" dirty="0">
+                          <a:solidFill>
+                            <a:schemeClr val="bg1">
+                              <a:lumMod val="50000"/>
+                            </a:schemeClr>
+                          </a:solidFill>
+                          <a:effectLst/>
+                          <a:latin typeface="Aptos Narrow" panose="020B0004020202020204" pitchFamily="34" charset="0"/>
+                        </a:rPr>
+                        <a:t>Personas and user journeys</a:t>
+                      </a:r>
+                    </a:p>
+                  </a:txBody>
+                  <a:tcPr marL="360000" marR="54000" marT="108000" marB="108000">
+                    <a:lnL w="12700" cap="flat" cmpd="sng" algn="ctr">
+                      <a:noFill/>
+                      <a:prstDash val="solid"/>
+                      <a:round/>
+                      <a:headEnd type="none" w="med" len="med"/>
+                      <a:tailEnd type="none" w="med" len="med"/>
+                    </a:lnL>
+                    <a:lnR w="12700" cap="flat" cmpd="sng" algn="ctr">
+                      <a:noFill/>
+                      <a:prstDash val="solid"/>
+                      <a:round/>
+                      <a:headEnd type="none" w="med" len="med"/>
+                      <a:tailEnd type="none" w="med" len="med"/>
+                    </a:lnR>
+                    <a:lnT w="12700" cap="flat" cmpd="sng" algn="ctr">
+                      <a:noFill/>
+                      <a:prstDash val="solid"/>
+                      <a:round/>
+                      <a:headEnd type="none" w="med" len="med"/>
+                      <a:tailEnd type="none" w="med" len="med"/>
+                    </a:lnT>
+                    <a:lnB w="12700" cap="flat" cmpd="sng" algn="ctr">
+                      <a:noFill/>
+                      <a:prstDash val="solid"/>
+                      <a:round/>
+                      <a:headEnd type="none" w="med" len="med"/>
+                      <a:tailEnd type="none" w="med" len="med"/>
+                    </a:lnB>
+                    <a:lnTlToBr w="12700" cmpd="sng">
+                      <a:noFill/>
+                      <a:prstDash val="solid"/>
+                    </a:lnTlToBr>
+                    <a:lnBlToTr w="12700" cmpd="sng">
+                      <a:noFill/>
+                      <a:prstDash val="solid"/>
+                    </a:lnBlToTr>
+                    <a:noFill/>
+                  </a:tcPr>
+                </a:tc>
+                <a:tc>
+                  <a:txBody>
+                    <a:bodyPr/>
+                    <a:lstStyle/>
+                    <a:p>
+                      <a:pPr algn="l" fontAlgn="b">
+                        <a:spcBef>
+                          <a:spcPts val="0"/>
+                        </a:spcBef>
+                        <a:spcAft>
+                          <a:spcPts val="0"/>
+                        </a:spcAft>
+                      </a:pPr>
+                      <a:r>
+                        <a:rPr lang="en-US" sz="2400" b="1" i="0" u="none" strike="noStrike" dirty="0">
+                          <a:solidFill>
+                            <a:schemeClr val="bg1">
+                              <a:lumMod val="50000"/>
+                            </a:schemeClr>
+                          </a:solidFill>
+                          <a:effectLst/>
+                          <a:latin typeface="Aptos Narrow" panose="020B0004020202020204" pitchFamily="34" charset="0"/>
+                        </a:rPr>
+                        <a:t>Modeling and</a:t>
+                      </a:r>
+                      <a:br>
+                        <a:rPr lang="en-US" sz="2400" b="1" i="0" u="none" strike="noStrike" dirty="0">
+                          <a:solidFill>
+                            <a:schemeClr val="bg1">
+                              <a:lumMod val="50000"/>
+                            </a:schemeClr>
+                          </a:solidFill>
+                          <a:effectLst/>
+                          <a:latin typeface="Aptos Narrow" panose="020B0004020202020204" pitchFamily="34" charset="0"/>
+                        </a:rPr>
+                      </a:br>
+                      <a:r>
+                        <a:rPr lang="en-US" sz="2400" b="1" i="0" u="none" strike="noStrike" dirty="0">
+                          <a:solidFill>
+                            <a:schemeClr val="bg1">
+                              <a:lumMod val="50000"/>
+                            </a:schemeClr>
+                          </a:solidFill>
+                          <a:effectLst/>
+                          <a:latin typeface="Aptos Narrow" panose="020B0004020202020204" pitchFamily="34" charset="0"/>
+                        </a:rPr>
+                        <a:t>mapping</a:t>
+                      </a:r>
+                    </a:p>
+                  </a:txBody>
+                  <a:tcPr marL="180000" marR="54000" marT="108000" marB="108000">
+                    <a:lnL w="12700" cap="flat" cmpd="sng" algn="ctr">
+                      <a:noFill/>
+                      <a:prstDash val="solid"/>
+                      <a:round/>
+                      <a:headEnd type="none" w="med" len="med"/>
+                      <a:tailEnd type="none" w="med" len="med"/>
+                    </a:lnL>
+                    <a:lnR w="12700" cap="flat" cmpd="sng" algn="ctr">
+                      <a:noFill/>
+                      <a:prstDash val="solid"/>
+                      <a:round/>
+                      <a:headEnd type="none" w="med" len="med"/>
+                      <a:tailEnd type="none" w="med" len="med"/>
+                    </a:lnR>
+                    <a:lnT w="12700" cap="flat" cmpd="sng" algn="ctr">
+                      <a:noFill/>
+                      <a:prstDash val="solid"/>
+                      <a:round/>
+                      <a:headEnd type="none" w="med" len="med"/>
+                      <a:tailEnd type="none" w="med" len="med"/>
+                    </a:lnT>
+                    <a:lnB w="12700" cap="flat" cmpd="sng" algn="ctr">
+                      <a:noFill/>
+                      <a:prstDash val="solid"/>
+                      <a:round/>
+                      <a:headEnd type="none" w="med" len="med"/>
+                      <a:tailEnd type="none" w="med" len="med"/>
+                    </a:lnB>
+                    <a:lnTlToBr w="12700" cmpd="sng">
+                      <a:noFill/>
+                      <a:prstDash val="solid"/>
+                    </a:lnTlToBr>
+                    <a:lnBlToTr w="12700" cmpd="sng">
+                      <a:noFill/>
+                      <a:prstDash val="solid"/>
+                    </a:lnBlToTr>
+                    <a:noFill/>
+                  </a:tcPr>
+                </a:tc>
+                <a:tc>
+                  <a:txBody>
+                    <a:bodyPr/>
+                    <a:lstStyle/>
+                    <a:p>
+                      <a:pPr algn="l" fontAlgn="b">
+                        <a:spcBef>
+                          <a:spcPts val="0"/>
+                        </a:spcBef>
+                        <a:spcAft>
+                          <a:spcPts val="0"/>
+                        </a:spcAft>
+                      </a:pPr>
+                      <a:r>
+                        <a:rPr lang="en-US" sz="2400" b="1" i="0" u="none" strike="noStrike" dirty="0">
+                          <a:solidFill>
+                            <a:schemeClr val="bg1">
+                              <a:lumMod val="50000"/>
+                            </a:schemeClr>
+                          </a:solidFill>
+                          <a:effectLst/>
+                          <a:latin typeface="Aptos Narrow" panose="020B0004020202020204" pitchFamily="34" charset="0"/>
+                        </a:rPr>
+                        <a:t>Validate with multiple institutes</a:t>
+                      </a:r>
+                    </a:p>
+                  </a:txBody>
+                  <a:tcPr marL="0" marR="54000" marT="108000" marB="108000">
+                    <a:lnL w="12700" cap="flat" cmpd="sng" algn="ctr">
+                      <a:noFill/>
+                      <a:prstDash val="solid"/>
+                      <a:round/>
+                      <a:headEnd type="none" w="med" len="med"/>
+                      <a:tailEnd type="none" w="med" len="med"/>
+                    </a:lnL>
+                    <a:lnR w="12700" cap="flat" cmpd="sng" algn="ctr">
+                      <a:noFill/>
+                      <a:prstDash val="solid"/>
+                      <a:round/>
+                      <a:headEnd type="none" w="med" len="med"/>
+                      <a:tailEnd type="none" w="med" len="med"/>
+                    </a:lnR>
+                    <a:lnT w="12700" cap="flat" cmpd="sng" algn="ctr">
+                      <a:noFill/>
+                      <a:prstDash val="solid"/>
+                      <a:round/>
+                      <a:headEnd type="none" w="med" len="med"/>
+                      <a:tailEnd type="none" w="med" len="med"/>
+                    </a:lnT>
+                    <a:lnB w="12700" cap="flat" cmpd="sng" algn="ctr">
+                      <a:noFill/>
+                      <a:prstDash val="solid"/>
+                      <a:round/>
+                      <a:headEnd type="none" w="med" len="med"/>
+                      <a:tailEnd type="none" w="med" len="med"/>
+                    </a:lnB>
+                    <a:lnTlToBr w="12700" cmpd="sng">
+                      <a:noFill/>
+                      <a:prstDash val="solid"/>
+                    </a:lnTlToBr>
+                    <a:lnBlToTr w="12700" cmpd="sng">
+                      <a:noFill/>
+                      <a:prstDash val="solid"/>
+                    </a:lnBlToTr>
+                    <a:noFill/>
+                  </a:tcPr>
+                </a:tc>
+                <a:extLst>
+                  <a:ext uri="{0D108BD9-81ED-4DB2-BD59-A6C34878D82A}">
+                    <a16:rowId xmlns:a16="http://schemas.microsoft.com/office/drawing/2014/main" val="3994694379"/>
+                  </a:ext>
+                </a:extLst>
+              </a:tr>
+              <a:tr h="752681">
+                <a:tc>
+                  <a:txBody>
+                    <a:bodyPr/>
+                    <a:lstStyle/>
+                    <a:p>
+                      <a:pPr algn="l" fontAlgn="b">
+                        <a:spcBef>
+                          <a:spcPts val="0"/>
+                        </a:spcBef>
+                        <a:spcAft>
+                          <a:spcPts val="0"/>
+                        </a:spcAft>
+                      </a:pPr>
+                      <a:r>
+                        <a:rPr lang="en-US" sz="2400" b="1" i="0" u="none" strike="noStrike" dirty="0">
+                          <a:solidFill>
+                            <a:schemeClr val="bg1">
+                              <a:lumMod val="50000"/>
+                            </a:schemeClr>
+                          </a:solidFill>
+                          <a:effectLst/>
+                          <a:latin typeface="Aptos Narrow" panose="020B0004020202020204" pitchFamily="34" charset="0"/>
+                        </a:rPr>
+                        <a:t>Landscape analysis</a:t>
+                      </a:r>
+                    </a:p>
+                  </a:txBody>
+                  <a:tcPr marL="144000" marR="54000" marT="108000" marB="108000">
+                    <a:lnL w="12700" cap="flat" cmpd="sng" algn="ctr">
+                      <a:noFill/>
+                      <a:prstDash val="solid"/>
+                      <a:round/>
+                      <a:headEnd type="none" w="med" len="med"/>
+                      <a:tailEnd type="none" w="med" len="med"/>
+                    </a:lnL>
+                    <a:lnR w="12700" cap="flat" cmpd="sng" algn="ctr">
+                      <a:noFill/>
+                      <a:prstDash val="solid"/>
+                      <a:round/>
+                      <a:headEnd type="none" w="med" len="med"/>
+                      <a:tailEnd type="none" w="med" len="med"/>
+                    </a:lnR>
+                    <a:lnT w="12700" cap="flat" cmpd="sng" algn="ctr">
+                      <a:noFill/>
+                      <a:prstDash val="solid"/>
+                      <a:round/>
+                      <a:headEnd type="none" w="med" len="med"/>
+                      <a:tailEnd type="none" w="med" len="med"/>
+                    </a:lnT>
+                    <a:lnB w="12700" cap="flat" cmpd="sng" algn="ctr">
+                      <a:noFill/>
+                      <a:prstDash val="solid"/>
+                      <a:round/>
+                      <a:headEnd type="none" w="med" len="med"/>
+                      <a:tailEnd type="none" w="med" len="med"/>
+                    </a:lnB>
+                    <a:lnTlToBr w="12700" cmpd="sng">
+                      <a:noFill/>
+                      <a:prstDash val="solid"/>
+                    </a:lnTlToBr>
+                    <a:lnBlToTr w="12700" cmpd="sng">
+                      <a:noFill/>
+                      <a:prstDash val="solid"/>
+                    </a:lnBlToTr>
+                    <a:noFill/>
+                  </a:tcPr>
+                </a:tc>
+                <a:tc>
+                  <a:txBody>
+                    <a:bodyPr/>
+                    <a:lstStyle/>
+                    <a:p>
+                      <a:pPr algn="l" fontAlgn="b">
+                        <a:spcBef>
+                          <a:spcPts val="0"/>
+                        </a:spcBef>
+                        <a:spcAft>
+                          <a:spcPts val="0"/>
+                        </a:spcAft>
+                      </a:pPr>
+                      <a:r>
+                        <a:rPr lang="en-US" sz="2400" b="1" i="0" u="none" strike="noStrike" dirty="0">
+                          <a:solidFill>
+                            <a:schemeClr val="bg1">
+                              <a:lumMod val="50000"/>
+                            </a:schemeClr>
+                          </a:solidFill>
+                          <a:effectLst/>
+                          <a:latin typeface="Aptos Narrow" panose="020B0004020202020204" pitchFamily="34" charset="0"/>
+                        </a:rPr>
+                        <a:t>Refine use cases</a:t>
+                      </a:r>
+                    </a:p>
+                  </a:txBody>
+                  <a:tcPr marL="360000" marR="54000" marT="108000" marB="108000">
+                    <a:lnL w="12700" cap="flat" cmpd="sng" algn="ctr">
+                      <a:noFill/>
+                      <a:prstDash val="solid"/>
+                      <a:round/>
+                      <a:headEnd type="none" w="med" len="med"/>
+                      <a:tailEnd type="none" w="med" len="med"/>
+                    </a:lnL>
+                    <a:lnR w="12700" cap="flat" cmpd="sng" algn="ctr">
+                      <a:noFill/>
+                      <a:prstDash val="solid"/>
+                      <a:round/>
+                      <a:headEnd type="none" w="med" len="med"/>
+                      <a:tailEnd type="none" w="med" len="med"/>
+                    </a:lnR>
+                    <a:lnT w="12700" cap="flat" cmpd="sng" algn="ctr">
+                      <a:noFill/>
+                      <a:prstDash val="solid"/>
+                      <a:round/>
+                      <a:headEnd type="none" w="med" len="med"/>
+                      <a:tailEnd type="none" w="med" len="med"/>
+                    </a:lnT>
+                    <a:lnB w="12700" cap="flat" cmpd="sng" algn="ctr">
+                      <a:noFill/>
+                      <a:prstDash val="solid"/>
+                      <a:round/>
+                      <a:headEnd type="none" w="med" len="med"/>
+                      <a:tailEnd type="none" w="med" len="med"/>
+                    </a:lnB>
+                    <a:lnTlToBr w="12700" cmpd="sng">
+                      <a:noFill/>
+                      <a:prstDash val="solid"/>
+                    </a:lnTlToBr>
+                    <a:lnBlToTr w="12700" cmpd="sng">
+                      <a:noFill/>
+                      <a:prstDash val="solid"/>
+                    </a:lnBlToTr>
+                    <a:noFill/>
+                  </a:tcPr>
+                </a:tc>
+                <a:tc>
+                  <a:txBody>
+                    <a:bodyPr/>
+                    <a:lstStyle/>
+                    <a:p>
+                      <a:pPr algn="l" fontAlgn="b">
+                        <a:spcBef>
+                          <a:spcPts val="0"/>
+                        </a:spcBef>
+                        <a:spcAft>
+                          <a:spcPts val="0"/>
+                        </a:spcAft>
+                      </a:pPr>
+                      <a:r>
+                        <a:rPr lang="en-US" sz="2400" b="1" i="0" u="none" strike="noStrike" dirty="0">
+                          <a:solidFill>
+                            <a:schemeClr val="bg1">
+                              <a:lumMod val="50000"/>
+                            </a:schemeClr>
+                          </a:solidFill>
+                          <a:effectLst/>
+                          <a:latin typeface="Aptos Narrow" panose="020B0004020202020204" pitchFamily="34" charset="0"/>
+                        </a:rPr>
+                        <a:t>Feedback</a:t>
+                      </a:r>
+                    </a:p>
+                  </a:txBody>
+                  <a:tcPr marL="180000" marR="54000" marT="108000" marB="108000">
+                    <a:lnL w="12700" cap="flat" cmpd="sng" algn="ctr">
+                      <a:noFill/>
+                      <a:prstDash val="solid"/>
+                      <a:round/>
+                      <a:headEnd type="none" w="med" len="med"/>
+                      <a:tailEnd type="none" w="med" len="med"/>
+                    </a:lnL>
+                    <a:lnR w="12700" cap="flat" cmpd="sng" algn="ctr">
+                      <a:noFill/>
+                      <a:prstDash val="solid"/>
+                      <a:round/>
+                      <a:headEnd type="none" w="med" len="med"/>
+                      <a:tailEnd type="none" w="med" len="med"/>
+                    </a:lnR>
+                    <a:lnT w="12700" cap="flat" cmpd="sng" algn="ctr">
+                      <a:noFill/>
+                      <a:prstDash val="solid"/>
+                      <a:round/>
+                      <a:headEnd type="none" w="med" len="med"/>
+                      <a:tailEnd type="none" w="med" len="med"/>
+                    </a:lnT>
+                    <a:lnB w="12700" cap="flat" cmpd="sng" algn="ctr">
+                      <a:noFill/>
+                      <a:prstDash val="solid"/>
+                      <a:round/>
+                      <a:headEnd type="none" w="med" len="med"/>
+                      <a:tailEnd type="none" w="med" len="med"/>
+                    </a:lnB>
+                    <a:lnTlToBr w="12700" cmpd="sng">
+                      <a:noFill/>
+                      <a:prstDash val="solid"/>
+                    </a:lnTlToBr>
+                    <a:lnBlToTr w="12700" cmpd="sng">
+                      <a:noFill/>
+                      <a:prstDash val="solid"/>
+                    </a:lnBlToTr>
+                    <a:noFill/>
+                  </a:tcPr>
+                </a:tc>
+                <a:tc>
+                  <a:txBody>
+                    <a:bodyPr/>
+                    <a:lstStyle/>
+                    <a:p>
+                      <a:pPr algn="l" fontAlgn="b">
+                        <a:spcBef>
+                          <a:spcPts val="0"/>
+                        </a:spcBef>
+                        <a:spcAft>
+                          <a:spcPts val="0"/>
+                        </a:spcAft>
+                      </a:pPr>
+                      <a:r>
+                        <a:rPr lang="en-US" sz="2400" b="1" i="0" u="none" strike="noStrike">
+                          <a:solidFill>
+                            <a:schemeClr val="bg1">
+                              <a:lumMod val="50000"/>
+                            </a:schemeClr>
+                          </a:solidFill>
+                          <a:effectLst/>
+                          <a:latin typeface="Aptos Narrow" panose="020B0004020202020204" pitchFamily="34" charset="0"/>
+                        </a:rPr>
+                        <a:t>Package output</a:t>
+                      </a:r>
+                    </a:p>
+                  </a:txBody>
+                  <a:tcPr marL="0" marR="54000" marT="108000" marB="108000">
+                    <a:lnL w="12700" cap="flat" cmpd="sng" algn="ctr">
+                      <a:noFill/>
+                      <a:prstDash val="solid"/>
+                      <a:round/>
+                      <a:headEnd type="none" w="med" len="med"/>
+                      <a:tailEnd type="none" w="med" len="med"/>
+                    </a:lnL>
+                    <a:lnR w="12700" cap="flat" cmpd="sng" algn="ctr">
+                      <a:noFill/>
+                      <a:prstDash val="solid"/>
+                      <a:round/>
+                      <a:headEnd type="none" w="med" len="med"/>
+                      <a:tailEnd type="none" w="med" len="med"/>
+                    </a:lnR>
+                    <a:lnT w="12700" cap="flat" cmpd="sng" algn="ctr">
+                      <a:noFill/>
+                      <a:prstDash val="solid"/>
+                      <a:round/>
+                      <a:headEnd type="none" w="med" len="med"/>
+                      <a:tailEnd type="none" w="med" len="med"/>
+                    </a:lnT>
+                    <a:lnB w="12700" cap="flat" cmpd="sng" algn="ctr">
+                      <a:noFill/>
+                      <a:prstDash val="solid"/>
+                      <a:round/>
+                      <a:headEnd type="none" w="med" len="med"/>
+                      <a:tailEnd type="none" w="med" len="med"/>
+                    </a:lnB>
+                    <a:lnTlToBr w="12700" cmpd="sng">
+                      <a:noFill/>
+                      <a:prstDash val="solid"/>
+                    </a:lnTlToBr>
+                    <a:lnBlToTr w="12700" cmpd="sng">
+                      <a:noFill/>
+                      <a:prstDash val="solid"/>
+                    </a:lnBlToTr>
+                    <a:noFill/>
+                  </a:tcPr>
+                </a:tc>
+                <a:extLst>
+                  <a:ext uri="{0D108BD9-81ED-4DB2-BD59-A6C34878D82A}">
+                    <a16:rowId xmlns:a16="http://schemas.microsoft.com/office/drawing/2014/main" val="3175000845"/>
+                  </a:ext>
+                </a:extLst>
+              </a:tr>
+              <a:tr h="752681">
+                <a:tc>
+                  <a:txBody>
+                    <a:bodyPr/>
+                    <a:lstStyle/>
+                    <a:p>
+                      <a:pPr algn="l" fontAlgn="b">
+                        <a:spcBef>
+                          <a:spcPts val="0"/>
+                        </a:spcBef>
+                        <a:spcAft>
+                          <a:spcPts val="0"/>
+                        </a:spcAft>
+                      </a:pPr>
+                      <a:r>
+                        <a:rPr lang="en-US" sz="2400" b="1" i="0" u="none" strike="noStrike" dirty="0">
+                          <a:solidFill>
+                            <a:schemeClr val="bg1">
+                              <a:lumMod val="50000"/>
+                            </a:schemeClr>
+                          </a:solidFill>
+                          <a:effectLst/>
+                          <a:latin typeface="Aptos Narrow" panose="020B0004020202020204" pitchFamily="34" charset="0"/>
+                        </a:rPr>
+                        <a:t>Stakeholder mapping</a:t>
+                      </a:r>
+                    </a:p>
+                  </a:txBody>
+                  <a:tcPr marL="144000" marR="54000" marT="108000" marB="108000">
+                    <a:lnL w="12700" cap="flat" cmpd="sng" algn="ctr">
+                      <a:noFill/>
+                      <a:prstDash val="solid"/>
+                      <a:round/>
+                      <a:headEnd type="none" w="med" len="med"/>
+                      <a:tailEnd type="none" w="med" len="med"/>
+                    </a:lnL>
+                    <a:lnR w="12700" cap="flat" cmpd="sng" algn="ctr">
+                      <a:noFill/>
+                      <a:prstDash val="solid"/>
+                      <a:round/>
+                      <a:headEnd type="none" w="med" len="med"/>
+                      <a:tailEnd type="none" w="med" len="med"/>
+                    </a:lnR>
+                    <a:lnT w="12700" cap="flat" cmpd="sng" algn="ctr">
+                      <a:noFill/>
+                      <a:prstDash val="solid"/>
+                      <a:round/>
+                      <a:headEnd type="none" w="med" len="med"/>
+                      <a:tailEnd type="none" w="med" len="med"/>
+                    </a:lnT>
+                    <a:lnB w="12700" cap="flat" cmpd="sng" algn="ctr">
+                      <a:noFill/>
+                      <a:prstDash val="solid"/>
+                      <a:round/>
+                      <a:headEnd type="none" w="med" len="med"/>
+                      <a:tailEnd type="none" w="med" len="med"/>
+                    </a:lnB>
+                    <a:lnTlToBr w="12700" cmpd="sng">
+                      <a:noFill/>
+                      <a:prstDash val="solid"/>
+                    </a:lnTlToBr>
+                    <a:lnBlToTr w="12700" cmpd="sng">
+                      <a:noFill/>
+                      <a:prstDash val="solid"/>
+                    </a:lnBlToTr>
+                    <a:noFill/>
+                  </a:tcPr>
+                </a:tc>
+                <a:tc>
+                  <a:txBody>
+                    <a:bodyPr/>
+                    <a:lstStyle/>
+                    <a:p>
+                      <a:pPr algn="l" fontAlgn="b">
+                        <a:spcBef>
+                          <a:spcPts val="0"/>
+                        </a:spcBef>
+                        <a:spcAft>
+                          <a:spcPts val="0"/>
+                        </a:spcAft>
+                      </a:pPr>
+                      <a:r>
+                        <a:rPr lang="en-US" sz="2400" b="1" i="0" u="none" strike="noStrike" dirty="0">
+                          <a:solidFill>
+                            <a:schemeClr val="bg1">
+                              <a:lumMod val="50000"/>
+                            </a:schemeClr>
+                          </a:solidFill>
+                          <a:effectLst/>
+                          <a:latin typeface="Aptos Narrow" panose="020B0004020202020204" pitchFamily="34" charset="0"/>
+                        </a:rPr>
+                        <a:t>Define success</a:t>
+                      </a:r>
+                    </a:p>
+                  </a:txBody>
+                  <a:tcPr marL="360000" marR="54000" marT="108000" marB="108000">
+                    <a:lnL w="12700" cap="flat" cmpd="sng" algn="ctr">
+                      <a:noFill/>
+                      <a:prstDash val="solid"/>
+                      <a:round/>
+                      <a:headEnd type="none" w="med" len="med"/>
+                      <a:tailEnd type="none" w="med" len="med"/>
+                    </a:lnL>
+                    <a:lnR w="12700" cap="flat" cmpd="sng" algn="ctr">
+                      <a:noFill/>
+                      <a:prstDash val="solid"/>
+                      <a:round/>
+                      <a:headEnd type="none" w="med" len="med"/>
+                      <a:tailEnd type="none" w="med" len="med"/>
+                    </a:lnR>
+                    <a:lnT w="12700" cap="flat" cmpd="sng" algn="ctr">
+                      <a:noFill/>
+                      <a:prstDash val="solid"/>
+                      <a:round/>
+                      <a:headEnd type="none" w="med" len="med"/>
+                      <a:tailEnd type="none" w="med" len="med"/>
+                    </a:lnT>
+                    <a:lnB w="12700" cap="flat" cmpd="sng" algn="ctr">
+                      <a:noFill/>
+                      <a:prstDash val="solid"/>
+                      <a:round/>
+                      <a:headEnd type="none" w="med" len="med"/>
+                      <a:tailEnd type="none" w="med" len="med"/>
+                    </a:lnB>
+                    <a:lnTlToBr w="12700" cmpd="sng">
+                      <a:noFill/>
+                      <a:prstDash val="solid"/>
+                    </a:lnTlToBr>
+                    <a:lnBlToTr w="12700" cmpd="sng">
+                      <a:noFill/>
+                      <a:prstDash val="solid"/>
+                    </a:lnBlToTr>
+                    <a:noFill/>
+                  </a:tcPr>
+                </a:tc>
+                <a:tc>
+                  <a:txBody>
+                    <a:bodyPr/>
+                    <a:lstStyle/>
+                    <a:p>
+                      <a:pPr algn="l" fontAlgn="b">
+                        <a:spcBef>
+                          <a:spcPts val="0"/>
+                        </a:spcBef>
+                        <a:spcAft>
+                          <a:spcPts val="0"/>
+                        </a:spcAft>
+                      </a:pPr>
+                      <a:r>
+                        <a:rPr lang="en-NL" sz="2400" b="1" i="0" u="none" strike="noStrike" dirty="0">
+                          <a:solidFill>
+                            <a:schemeClr val="bg1">
+                              <a:lumMod val="50000"/>
+                            </a:schemeClr>
+                          </a:solidFill>
+                          <a:effectLst/>
+                          <a:latin typeface="Aptos Narrow" panose="020B0004020202020204" pitchFamily="34" charset="0"/>
+                        </a:rPr>
+                        <a:t> </a:t>
+                      </a:r>
+                    </a:p>
+                  </a:txBody>
+                  <a:tcPr marL="180000" marR="54000" marT="108000" marB="108000">
+                    <a:lnL w="12700" cap="flat" cmpd="sng" algn="ctr">
+                      <a:noFill/>
+                      <a:prstDash val="solid"/>
+                      <a:round/>
+                      <a:headEnd type="none" w="med" len="med"/>
+                      <a:tailEnd type="none" w="med" len="med"/>
+                    </a:lnL>
+                    <a:lnR w="12700" cap="flat" cmpd="sng" algn="ctr">
+                      <a:noFill/>
+                      <a:prstDash val="solid"/>
+                      <a:round/>
+                      <a:headEnd type="none" w="med" len="med"/>
+                      <a:tailEnd type="none" w="med" len="med"/>
+                    </a:lnR>
+                    <a:lnT w="12700" cap="flat" cmpd="sng" algn="ctr">
+                      <a:noFill/>
+                      <a:prstDash val="solid"/>
+                      <a:round/>
+                      <a:headEnd type="none" w="med" len="med"/>
+                      <a:tailEnd type="none" w="med" len="med"/>
+                    </a:lnT>
+                    <a:lnB w="12700" cap="flat" cmpd="sng" algn="ctr">
+                      <a:noFill/>
+                      <a:prstDash val="solid"/>
+                      <a:round/>
+                      <a:headEnd type="none" w="med" len="med"/>
+                      <a:tailEnd type="none" w="med" len="med"/>
+                    </a:lnB>
+                    <a:lnTlToBr w="12700" cmpd="sng">
+                      <a:noFill/>
+                      <a:prstDash val="solid"/>
+                    </a:lnTlToBr>
+                    <a:lnBlToTr w="12700" cmpd="sng">
+                      <a:noFill/>
+                      <a:prstDash val="solid"/>
+                    </a:lnBlToTr>
+                    <a:noFill/>
+                  </a:tcPr>
+                </a:tc>
+                <a:tc>
+                  <a:txBody>
+                    <a:bodyPr/>
+                    <a:lstStyle/>
+                    <a:p>
+                      <a:pPr algn="l" fontAlgn="b">
+                        <a:spcBef>
+                          <a:spcPts val="0"/>
+                        </a:spcBef>
+                        <a:spcAft>
+                          <a:spcPts val="0"/>
+                        </a:spcAft>
+                      </a:pPr>
+                      <a:r>
+                        <a:rPr lang="en-US" sz="2400" b="1" i="0" u="none" strike="noStrike" dirty="0">
+                          <a:solidFill>
+                            <a:schemeClr val="bg1">
+                              <a:lumMod val="50000"/>
+                            </a:schemeClr>
+                          </a:solidFill>
+                          <a:effectLst/>
+                          <a:latin typeface="Aptos Narrow" panose="020B0004020202020204" pitchFamily="34" charset="0"/>
+                        </a:rPr>
+                        <a:t>Governance plan</a:t>
+                      </a:r>
+                    </a:p>
+                  </a:txBody>
+                  <a:tcPr marL="0" marR="54000" marT="108000" marB="108000">
+                    <a:lnL w="12700" cap="flat" cmpd="sng" algn="ctr">
+                      <a:noFill/>
+                      <a:prstDash val="solid"/>
+                      <a:round/>
+                      <a:headEnd type="none" w="med" len="med"/>
+                      <a:tailEnd type="none" w="med" len="med"/>
+                    </a:lnL>
+                    <a:lnR w="12700" cap="flat" cmpd="sng" algn="ctr">
+                      <a:noFill/>
+                      <a:prstDash val="solid"/>
+                      <a:round/>
+                      <a:headEnd type="none" w="med" len="med"/>
+                      <a:tailEnd type="none" w="med" len="med"/>
+                    </a:lnR>
+                    <a:lnT w="12700" cap="flat" cmpd="sng" algn="ctr">
+                      <a:noFill/>
+                      <a:prstDash val="solid"/>
+                      <a:round/>
+                      <a:headEnd type="none" w="med" len="med"/>
+                      <a:tailEnd type="none" w="med" len="med"/>
+                    </a:lnT>
+                    <a:lnB w="12700" cap="flat" cmpd="sng" algn="ctr">
+                      <a:noFill/>
+                      <a:prstDash val="solid"/>
+                      <a:round/>
+                      <a:headEnd type="none" w="med" len="med"/>
+                      <a:tailEnd type="none" w="med" len="med"/>
+                    </a:lnB>
+                    <a:lnTlToBr w="12700" cmpd="sng">
+                      <a:noFill/>
+                      <a:prstDash val="solid"/>
+                    </a:lnTlToBr>
+                    <a:lnBlToTr w="12700" cmpd="sng">
+                      <a:noFill/>
+                      <a:prstDash val="solid"/>
+                    </a:lnBlToTr>
+                    <a:noFill/>
+                  </a:tcPr>
+                </a:tc>
+                <a:extLst>
+                  <a:ext uri="{0D108BD9-81ED-4DB2-BD59-A6C34878D82A}">
+                    <a16:rowId xmlns:a16="http://schemas.microsoft.com/office/drawing/2014/main" val="3566916367"/>
+                  </a:ext>
+                </a:extLst>
+              </a:tr>
+              <a:tr h="752681">
+                <a:tc>
+                  <a:txBody>
+                    <a:bodyPr/>
+                    <a:lstStyle/>
+                    <a:p>
+                      <a:pPr algn="l" fontAlgn="b">
+                        <a:spcBef>
+                          <a:spcPts val="0"/>
+                        </a:spcBef>
+                        <a:spcAft>
+                          <a:spcPts val="0"/>
+                        </a:spcAft>
+                      </a:pPr>
+                      <a:r>
+                        <a:rPr lang="en-US" sz="2400" b="1" i="0" u="none" strike="noStrike" dirty="0">
+                          <a:solidFill>
+                            <a:schemeClr val="bg1">
+                              <a:lumMod val="50000"/>
+                            </a:schemeClr>
+                          </a:solidFill>
+                          <a:effectLst/>
+                          <a:latin typeface="Aptos Narrow" panose="020B0004020202020204" pitchFamily="34" charset="0"/>
+                        </a:rPr>
+                        <a:t>Initial use cases</a:t>
+                      </a:r>
+                    </a:p>
+                  </a:txBody>
+                  <a:tcPr marL="144000" marR="54000" marT="108000" marB="108000">
+                    <a:lnL w="12700" cap="flat" cmpd="sng" algn="ctr">
+                      <a:noFill/>
+                      <a:prstDash val="solid"/>
+                      <a:round/>
+                      <a:headEnd type="none" w="med" len="med"/>
+                      <a:tailEnd type="none" w="med" len="med"/>
+                    </a:lnL>
+                    <a:lnR w="12700" cap="flat" cmpd="sng" algn="ctr">
+                      <a:noFill/>
+                      <a:prstDash val="solid"/>
+                      <a:round/>
+                      <a:headEnd type="none" w="med" len="med"/>
+                      <a:tailEnd type="none" w="med" len="med"/>
+                    </a:lnR>
+                    <a:lnT w="12700" cap="flat" cmpd="sng" algn="ctr">
+                      <a:noFill/>
+                      <a:prstDash val="solid"/>
+                      <a:round/>
+                      <a:headEnd type="none" w="med" len="med"/>
+                      <a:tailEnd type="none" w="med" len="med"/>
+                    </a:lnT>
+                    <a:lnB w="12700" cap="flat" cmpd="sng" algn="ctr">
+                      <a:noFill/>
+                      <a:prstDash val="solid"/>
+                      <a:round/>
+                      <a:headEnd type="none" w="med" len="med"/>
+                      <a:tailEnd type="none" w="med" len="med"/>
+                    </a:lnB>
+                    <a:lnTlToBr w="12700" cmpd="sng">
+                      <a:noFill/>
+                      <a:prstDash val="solid"/>
+                    </a:lnTlToBr>
+                    <a:lnBlToTr w="12700" cmpd="sng">
+                      <a:noFill/>
+                      <a:prstDash val="solid"/>
+                    </a:lnBlToTr>
+                    <a:noFill/>
+                  </a:tcPr>
+                </a:tc>
+                <a:tc>
+                  <a:txBody>
+                    <a:bodyPr/>
+                    <a:lstStyle/>
+                    <a:p>
+                      <a:pPr algn="l" fontAlgn="b">
+                        <a:spcBef>
+                          <a:spcPts val="0"/>
+                        </a:spcBef>
+                        <a:spcAft>
+                          <a:spcPts val="0"/>
+                        </a:spcAft>
+                      </a:pPr>
+                      <a:r>
+                        <a:rPr lang="en-US" sz="2400" b="1" i="0" u="none" strike="noStrike" dirty="0">
+                          <a:solidFill>
+                            <a:schemeClr val="bg1">
+                              <a:lumMod val="50000"/>
+                            </a:schemeClr>
+                          </a:solidFill>
+                          <a:effectLst/>
+                          <a:latin typeface="Aptos Narrow" panose="020B0004020202020204" pitchFamily="34" charset="0"/>
+                        </a:rPr>
+                        <a:t>Solution sketch</a:t>
+                      </a:r>
+                    </a:p>
+                  </a:txBody>
+                  <a:tcPr marL="360000" marR="54000" marT="108000" marB="108000">
+                    <a:lnL w="12700" cap="flat" cmpd="sng" algn="ctr">
+                      <a:noFill/>
+                      <a:prstDash val="solid"/>
+                      <a:round/>
+                      <a:headEnd type="none" w="med" len="med"/>
+                      <a:tailEnd type="none" w="med" len="med"/>
+                    </a:lnL>
+                    <a:lnR w="12700" cap="flat" cmpd="sng" algn="ctr">
+                      <a:noFill/>
+                      <a:prstDash val="solid"/>
+                      <a:round/>
+                      <a:headEnd type="none" w="med" len="med"/>
+                      <a:tailEnd type="none" w="med" len="med"/>
+                    </a:lnR>
+                    <a:lnT w="12700" cap="flat" cmpd="sng" algn="ctr">
+                      <a:noFill/>
+                      <a:prstDash val="solid"/>
+                      <a:round/>
+                      <a:headEnd type="none" w="med" len="med"/>
+                      <a:tailEnd type="none" w="med" len="med"/>
+                    </a:lnT>
+                    <a:lnB w="12700" cap="flat" cmpd="sng" algn="ctr">
+                      <a:noFill/>
+                      <a:prstDash val="solid"/>
+                      <a:round/>
+                      <a:headEnd type="none" w="med" len="med"/>
+                      <a:tailEnd type="none" w="med" len="med"/>
+                    </a:lnB>
+                    <a:lnTlToBr w="12700" cmpd="sng">
+                      <a:noFill/>
+                      <a:prstDash val="solid"/>
+                    </a:lnTlToBr>
+                    <a:lnBlToTr w="12700" cmpd="sng">
+                      <a:noFill/>
+                      <a:prstDash val="solid"/>
+                    </a:lnBlToTr>
+                    <a:noFill/>
+                  </a:tcPr>
+                </a:tc>
+                <a:tc>
+                  <a:txBody>
+                    <a:bodyPr/>
+                    <a:lstStyle/>
+                    <a:p>
+                      <a:pPr algn="l" fontAlgn="b">
+                        <a:spcBef>
+                          <a:spcPts val="0"/>
+                        </a:spcBef>
+                        <a:spcAft>
+                          <a:spcPts val="0"/>
+                        </a:spcAft>
+                      </a:pPr>
+                      <a:r>
+                        <a:rPr lang="en-NL" sz="2400" b="1" i="0" u="none" strike="noStrike" dirty="0">
+                          <a:solidFill>
+                            <a:schemeClr val="bg1">
+                              <a:lumMod val="50000"/>
+                            </a:schemeClr>
+                          </a:solidFill>
+                          <a:effectLst/>
+                          <a:latin typeface="Aptos Narrow" panose="020B0004020202020204" pitchFamily="34" charset="0"/>
+                        </a:rPr>
+                        <a:t> </a:t>
+                      </a:r>
+                    </a:p>
+                  </a:txBody>
+                  <a:tcPr marL="180000" marR="54000" marT="108000" marB="108000">
+                    <a:lnL w="12700" cap="flat" cmpd="sng" algn="ctr">
+                      <a:noFill/>
+                      <a:prstDash val="solid"/>
+                      <a:round/>
+                      <a:headEnd type="none" w="med" len="med"/>
+                      <a:tailEnd type="none" w="med" len="med"/>
+                    </a:lnL>
+                    <a:lnR w="12700" cap="flat" cmpd="sng" algn="ctr">
+                      <a:noFill/>
+                      <a:prstDash val="solid"/>
+                      <a:round/>
+                      <a:headEnd type="none" w="med" len="med"/>
+                      <a:tailEnd type="none" w="med" len="med"/>
+                    </a:lnR>
+                    <a:lnT w="12700" cap="flat" cmpd="sng" algn="ctr">
+                      <a:noFill/>
+                      <a:prstDash val="solid"/>
+                      <a:round/>
+                      <a:headEnd type="none" w="med" len="med"/>
+                      <a:tailEnd type="none" w="med" len="med"/>
+                    </a:lnT>
+                    <a:lnB w="12700" cap="flat" cmpd="sng" algn="ctr">
+                      <a:noFill/>
+                      <a:prstDash val="solid"/>
+                      <a:round/>
+                      <a:headEnd type="none" w="med" len="med"/>
+                      <a:tailEnd type="none" w="med" len="med"/>
+                    </a:lnB>
+                    <a:lnTlToBr w="12700" cmpd="sng">
+                      <a:noFill/>
+                      <a:prstDash val="solid"/>
+                    </a:lnTlToBr>
+                    <a:lnBlToTr w="12700" cmpd="sng">
+                      <a:noFill/>
+                      <a:prstDash val="solid"/>
+                    </a:lnBlToTr>
+                    <a:noFill/>
+                  </a:tcPr>
+                </a:tc>
+                <a:tc>
+                  <a:txBody>
+                    <a:bodyPr/>
+                    <a:lstStyle/>
+                    <a:p>
+                      <a:pPr algn="l" fontAlgn="b">
+                        <a:spcBef>
+                          <a:spcPts val="0"/>
+                        </a:spcBef>
+                        <a:spcAft>
+                          <a:spcPts val="0"/>
+                        </a:spcAft>
+                      </a:pPr>
+                      <a:r>
+                        <a:rPr lang="en-US" sz="2400" b="1" i="0" u="none" strike="noStrike" dirty="0">
+                          <a:solidFill>
+                            <a:schemeClr val="bg1">
+                              <a:lumMod val="50000"/>
+                            </a:schemeClr>
+                          </a:solidFill>
+                          <a:effectLst/>
+                          <a:latin typeface="Aptos Narrow" panose="020B0004020202020204" pitchFamily="34" charset="0"/>
+                        </a:rPr>
+                        <a:t>Go / No go</a:t>
+                      </a:r>
+                    </a:p>
+                  </a:txBody>
+                  <a:tcPr marL="0" marR="54000" marT="108000" marB="108000">
+                    <a:lnL w="12700" cap="flat" cmpd="sng" algn="ctr">
+                      <a:noFill/>
+                      <a:prstDash val="solid"/>
+                      <a:round/>
+                      <a:headEnd type="none" w="med" len="med"/>
+                      <a:tailEnd type="none" w="med" len="med"/>
+                    </a:lnL>
+                    <a:lnR w="12700" cap="flat" cmpd="sng" algn="ctr">
+                      <a:noFill/>
+                      <a:prstDash val="solid"/>
+                      <a:round/>
+                      <a:headEnd type="none" w="med" len="med"/>
+                      <a:tailEnd type="none" w="med" len="med"/>
+                    </a:lnR>
+                    <a:lnT w="12700" cap="flat" cmpd="sng" algn="ctr">
+                      <a:noFill/>
+                      <a:prstDash val="solid"/>
+                      <a:round/>
+                      <a:headEnd type="none" w="med" len="med"/>
+                      <a:tailEnd type="none" w="med" len="med"/>
+                    </a:lnT>
+                    <a:lnB w="12700" cap="flat" cmpd="sng" algn="ctr">
+                      <a:noFill/>
+                      <a:prstDash val="solid"/>
+                      <a:round/>
+                      <a:headEnd type="none" w="med" len="med"/>
+                      <a:tailEnd type="none" w="med" len="med"/>
+                    </a:lnB>
+                    <a:lnTlToBr w="12700" cmpd="sng">
+                      <a:noFill/>
+                      <a:prstDash val="solid"/>
+                    </a:lnTlToBr>
+                    <a:lnBlToTr w="12700" cmpd="sng">
+                      <a:noFill/>
+                      <a:prstDash val="solid"/>
+                    </a:lnBlToTr>
+                    <a:noFill/>
+                  </a:tcPr>
+                </a:tc>
+                <a:extLst>
+                  <a:ext uri="{0D108BD9-81ED-4DB2-BD59-A6C34878D82A}">
+                    <a16:rowId xmlns:a16="http://schemas.microsoft.com/office/drawing/2014/main" val="1929466116"/>
+                  </a:ext>
+                </a:extLst>
+              </a:tr>
+            </a:tbl>
+          </a:graphicData>
+        </a:graphic>
+      </p:graphicFrame>
+      <p:cxnSp>
+        <p:nvCxnSpPr>
+          <p:cNvPr id="35" name="Straight Connector 34">
+            <a:extLst>
+              <a:ext uri="{FF2B5EF4-FFF2-40B4-BE49-F238E27FC236}">
+                <a16:creationId xmlns:a16="http://schemas.microsoft.com/office/drawing/2014/main" id="{B931CFAF-F2B9-3234-F756-82E50CACCDE1}"/>
+              </a:ext>
+            </a:extLst>
+          </p:cNvPr>
+          <p:cNvCxnSpPr>
+            <a:cxnSpLocks/>
+          </p:cNvCxnSpPr>
+          <p:nvPr/>
+        </p:nvCxnSpPr>
+        <p:spPr>
+          <a:xfrm>
+            <a:off x="9727370" y="7069774"/>
+            <a:ext cx="0" cy="3141026"/>
+          </a:xfrm>
+          <a:prstGeom prst="line">
+            <a:avLst/>
+          </a:prstGeom>
+          <a:ln w="38100">
+            <a:solidFill>
+              <a:schemeClr val="bg1">
+                <a:lumMod val="85000"/>
+              </a:schemeClr>
+            </a:solidFill>
+            <a:prstDash val="dash"/>
+          </a:ln>
+        </p:spPr>
+        <p:style>
+          <a:lnRef idx="2">
+            <a:schemeClr val="accent1"/>
+          </a:lnRef>
+          <a:fillRef idx="0">
+            <a:schemeClr val="accent1"/>
+          </a:fillRef>
+          <a:effectRef idx="1">
+            <a:schemeClr val="accent1"/>
+          </a:effectRef>
+          <a:fontRef idx="minor">
+            <a:schemeClr val="tx1"/>
+          </a:fontRef>
+        </p:style>
+      </p:cxnSp>
+      <p:cxnSp>
+        <p:nvCxnSpPr>
+          <p:cNvPr id="36" name="Straight Connector 35">
+            <a:extLst>
+              <a:ext uri="{FF2B5EF4-FFF2-40B4-BE49-F238E27FC236}">
+                <a16:creationId xmlns:a16="http://schemas.microsoft.com/office/drawing/2014/main" id="{C5AF0E24-1662-AA47-626F-4588A4F28CA1}"/>
+              </a:ext>
+            </a:extLst>
+          </p:cNvPr>
+          <p:cNvCxnSpPr>
+            <a:cxnSpLocks/>
+          </p:cNvCxnSpPr>
+          <p:nvPr/>
+        </p:nvCxnSpPr>
+        <p:spPr>
+          <a:xfrm flipH="1">
+            <a:off x="12599986" y="7069774"/>
+            <a:ext cx="3104" cy="3141026"/>
+          </a:xfrm>
+          <a:prstGeom prst="line">
+            <a:avLst/>
+          </a:prstGeom>
+          <a:ln w="38100">
+            <a:solidFill>
+              <a:schemeClr val="bg1">
+                <a:lumMod val="85000"/>
+              </a:schemeClr>
+            </a:solidFill>
+            <a:prstDash val="dash"/>
+          </a:ln>
+        </p:spPr>
+        <p:style>
+          <a:lnRef idx="2">
+            <a:schemeClr val="accent1"/>
+          </a:lnRef>
+          <a:fillRef idx="0">
+            <a:schemeClr val="accent1"/>
+          </a:fillRef>
+          <a:effectRef idx="1">
+            <a:schemeClr val="accent1"/>
+          </a:effectRef>
+          <a:fontRef idx="minor">
+            <a:schemeClr val="tx1"/>
+          </a:fontRef>
+        </p:style>
+      </p:cxnSp>
+      <p:cxnSp>
+        <p:nvCxnSpPr>
+          <p:cNvPr id="37" name="Straight Connector 36">
+            <a:extLst>
+              <a:ext uri="{FF2B5EF4-FFF2-40B4-BE49-F238E27FC236}">
+                <a16:creationId xmlns:a16="http://schemas.microsoft.com/office/drawing/2014/main" id="{122EAC78-B00A-0E13-3729-90BCF73CABB8}"/>
+              </a:ext>
+            </a:extLst>
+          </p:cNvPr>
+          <p:cNvCxnSpPr>
+            <a:cxnSpLocks/>
+          </p:cNvCxnSpPr>
+          <p:nvPr/>
+        </p:nvCxnSpPr>
+        <p:spPr>
+          <a:xfrm>
+            <a:off x="15478810" y="7069774"/>
+            <a:ext cx="0" cy="3141026"/>
+          </a:xfrm>
+          <a:prstGeom prst="line">
+            <a:avLst/>
+          </a:prstGeom>
+          <a:ln w="38100">
+            <a:solidFill>
+              <a:schemeClr val="bg1">
+                <a:lumMod val="85000"/>
+              </a:schemeClr>
+            </a:solidFill>
+            <a:prstDash val="dash"/>
+          </a:ln>
+        </p:spPr>
+        <p:style>
+          <a:lnRef idx="2">
+            <a:schemeClr val="accent1"/>
+          </a:lnRef>
+          <a:fillRef idx="0">
+            <a:schemeClr val="accent1"/>
+          </a:fillRef>
+          <a:effectRef idx="1">
+            <a:schemeClr val="accent1"/>
+          </a:effectRef>
+          <a:fontRef idx="minor">
+            <a:schemeClr val="tx1"/>
+          </a:fontRef>
+        </p:style>
+      </p:cxnSp>
+      <p:cxnSp>
+        <p:nvCxnSpPr>
+          <p:cNvPr id="38" name="Straight Connector 37">
+            <a:extLst>
+              <a:ext uri="{FF2B5EF4-FFF2-40B4-BE49-F238E27FC236}">
+                <a16:creationId xmlns:a16="http://schemas.microsoft.com/office/drawing/2014/main" id="{34D9B674-0395-6AC0-60A4-BC568CEE73EA}"/>
+              </a:ext>
+            </a:extLst>
+          </p:cNvPr>
+          <p:cNvCxnSpPr>
+            <a:cxnSpLocks/>
+          </p:cNvCxnSpPr>
+          <p:nvPr/>
+        </p:nvCxnSpPr>
+        <p:spPr>
+          <a:xfrm>
+            <a:off x="18721388" y="7069774"/>
+            <a:ext cx="0" cy="3141026"/>
+          </a:xfrm>
+          <a:prstGeom prst="line">
+            <a:avLst/>
+          </a:prstGeom>
+          <a:ln w="38100">
+            <a:solidFill>
+              <a:schemeClr val="bg1">
+                <a:lumMod val="85000"/>
+              </a:schemeClr>
+            </a:solidFill>
+            <a:prstDash val="dash"/>
+          </a:ln>
+        </p:spPr>
+        <p:style>
+          <a:lnRef idx="2">
+            <a:schemeClr val="accent1"/>
+          </a:lnRef>
+          <a:fillRef idx="0">
+            <a:schemeClr val="accent1"/>
+          </a:fillRef>
+          <a:effectRef idx="1">
+            <a:schemeClr val="accent1"/>
+          </a:effectRef>
+          <a:fontRef idx="minor">
+            <a:schemeClr val="tx1"/>
+          </a:fontRef>
+        </p:style>
+      </p:cxnSp>
+      <p:cxnSp>
+        <p:nvCxnSpPr>
+          <p:cNvPr id="39" name="Straight Connector 38">
+            <a:extLst>
+              <a:ext uri="{FF2B5EF4-FFF2-40B4-BE49-F238E27FC236}">
+                <a16:creationId xmlns:a16="http://schemas.microsoft.com/office/drawing/2014/main" id="{CE903F50-36EE-5E14-B7B1-881A77E56FA2}"/>
+              </a:ext>
+            </a:extLst>
+          </p:cNvPr>
+          <p:cNvCxnSpPr>
+            <a:cxnSpLocks/>
+          </p:cNvCxnSpPr>
+          <p:nvPr/>
+        </p:nvCxnSpPr>
+        <p:spPr>
+          <a:xfrm>
+            <a:off x="6477063" y="7103800"/>
+            <a:ext cx="0" cy="3107000"/>
+          </a:xfrm>
+          <a:prstGeom prst="line">
+            <a:avLst/>
+          </a:prstGeom>
+          <a:ln w="38100">
+            <a:solidFill>
+              <a:schemeClr val="bg1">
+                <a:lumMod val="85000"/>
+              </a:schemeClr>
+            </a:solidFill>
+            <a:prstDash val="dash"/>
+          </a:ln>
+        </p:spPr>
+        <p:style>
+          <a:lnRef idx="2">
+            <a:schemeClr val="accent1"/>
+          </a:lnRef>
+          <a:fillRef idx="0">
+            <a:schemeClr val="accent1"/>
+          </a:fillRef>
+          <a:effectRef idx="1">
+            <a:schemeClr val="accent1"/>
+          </a:effectRef>
+          <a:fontRef idx="minor">
+            <a:schemeClr val="tx1"/>
+          </a:fontRef>
+        </p:style>
+      </p:cxnSp>
+      <p:sp>
+        <p:nvSpPr>
+          <p:cNvPr id="40" name="Isosceles Triangle 39">
+            <a:extLst>
+              <a:ext uri="{FF2B5EF4-FFF2-40B4-BE49-F238E27FC236}">
+                <a16:creationId xmlns:a16="http://schemas.microsoft.com/office/drawing/2014/main" id="{1B1F6981-94F7-1C39-9593-FD2F4FBCC5EE}"/>
+              </a:ext>
+            </a:extLst>
+          </p:cNvPr>
+          <p:cNvSpPr/>
+          <p:nvPr/>
+        </p:nvSpPr>
+        <p:spPr>
+          <a:xfrm rot="2700000">
+            <a:off x="8049207" y="2122516"/>
+            <a:ext cx="606825" cy="523125"/>
+          </a:xfrm>
+          <a:prstGeom prst="triangle">
+            <a:avLst/>
+          </a:prstGeom>
+          <a:solidFill>
+            <a:srgbClr val="F7AD2C"/>
+          </a:solidFill>
+          <a:ln>
+            <a:noFill/>
+          </a:ln>
+        </p:spPr>
+        <p:style>
+          <a:lnRef idx="2">
+            <a:schemeClr val="accent1">
+              <a:shade val="15000"/>
+            </a:schemeClr>
+          </a:lnRef>
+          <a:fillRef idx="1">
+            <a:schemeClr val="accent1"/>
+          </a:fillRef>
+          <a:effectRef idx="0">
+            <a:schemeClr val="accent1"/>
+          </a:effectRef>
+          <a:fontRef idx="minor">
+            <a:schemeClr val="lt1"/>
+          </a:fontRef>
+        </p:style>
+        <p:txBody>
+          <a:bodyPr rtlCol="0" anchor="ctr"/>
+          <a:lstStyle/>
+          <a:p>
+            <a:pPr algn="ctr"/>
+            <a:endParaRPr lang="en-NL"/>
+          </a:p>
+        </p:txBody>
+      </p:sp>
+      <p:sp>
+        <p:nvSpPr>
+          <p:cNvPr id="41" name="Isosceles Triangle 40">
+            <a:extLst>
+              <a:ext uri="{FF2B5EF4-FFF2-40B4-BE49-F238E27FC236}">
+                <a16:creationId xmlns:a16="http://schemas.microsoft.com/office/drawing/2014/main" id="{21003223-E228-6F27-0F40-F3DF0D46E30E}"/>
+              </a:ext>
+            </a:extLst>
+          </p:cNvPr>
+          <p:cNvSpPr/>
+          <p:nvPr/>
+        </p:nvSpPr>
+        <p:spPr>
+          <a:xfrm rot="2700000">
+            <a:off x="10797109" y="5117759"/>
+            <a:ext cx="606825" cy="523125"/>
+          </a:xfrm>
+          <a:prstGeom prst="triangle">
+            <a:avLst/>
+          </a:prstGeom>
+          <a:solidFill>
+            <a:srgbClr val="F7AD2C"/>
+          </a:solidFill>
+          <a:ln>
+            <a:noFill/>
+          </a:ln>
+        </p:spPr>
+        <p:style>
+          <a:lnRef idx="2">
+            <a:schemeClr val="accent1">
+              <a:shade val="15000"/>
+            </a:schemeClr>
+          </a:lnRef>
+          <a:fillRef idx="1">
+            <a:schemeClr val="accent1"/>
+          </a:fillRef>
+          <a:effectRef idx="0">
+            <a:schemeClr val="accent1"/>
+          </a:effectRef>
+          <a:fontRef idx="minor">
+            <a:schemeClr val="lt1"/>
+          </a:fontRef>
+        </p:style>
+        <p:txBody>
+          <a:bodyPr rtlCol="0" anchor="ctr"/>
+          <a:lstStyle/>
+          <a:p>
+            <a:pPr algn="ctr"/>
+            <a:endParaRPr lang="en-NL"/>
+          </a:p>
+        </p:txBody>
+      </p:sp>
+      <p:sp>
+        <p:nvSpPr>
+          <p:cNvPr id="42" name="Isosceles Triangle 41">
+            <a:extLst>
+              <a:ext uri="{FF2B5EF4-FFF2-40B4-BE49-F238E27FC236}">
+                <a16:creationId xmlns:a16="http://schemas.microsoft.com/office/drawing/2014/main" id="{97B62E1A-6DC0-381E-D1A7-3397AEAAC298}"/>
+              </a:ext>
+            </a:extLst>
+          </p:cNvPr>
+          <p:cNvSpPr/>
+          <p:nvPr/>
+        </p:nvSpPr>
+        <p:spPr>
+          <a:xfrm rot="2700000">
+            <a:off x="13783140" y="2122516"/>
+            <a:ext cx="606825" cy="523125"/>
+          </a:xfrm>
+          <a:prstGeom prst="triangle">
+            <a:avLst/>
+          </a:prstGeom>
+          <a:solidFill>
+            <a:srgbClr val="F7AD2C"/>
+          </a:solidFill>
+          <a:ln>
+            <a:noFill/>
+          </a:ln>
+        </p:spPr>
+        <p:style>
+          <a:lnRef idx="2">
+            <a:schemeClr val="accent1">
+              <a:shade val="15000"/>
+            </a:schemeClr>
+          </a:lnRef>
+          <a:fillRef idx="1">
+            <a:schemeClr val="accent1"/>
+          </a:fillRef>
+          <a:effectRef idx="0">
+            <a:schemeClr val="accent1"/>
+          </a:effectRef>
+          <a:fontRef idx="minor">
+            <a:schemeClr val="lt1"/>
+          </a:fontRef>
+        </p:style>
+        <p:txBody>
+          <a:bodyPr rtlCol="0" anchor="ctr"/>
+          <a:lstStyle/>
+          <a:p>
+            <a:pPr algn="ctr"/>
+            <a:endParaRPr lang="en-NL"/>
+          </a:p>
+        </p:txBody>
+      </p:sp>
+      <p:sp>
+        <p:nvSpPr>
+          <p:cNvPr id="43" name="Isosceles Triangle 42">
+            <a:extLst>
+              <a:ext uri="{FF2B5EF4-FFF2-40B4-BE49-F238E27FC236}">
+                <a16:creationId xmlns:a16="http://schemas.microsoft.com/office/drawing/2014/main" id="{4827F8F9-10AE-4855-B168-DEFDAF8C2358}"/>
+              </a:ext>
+            </a:extLst>
+          </p:cNvPr>
+          <p:cNvSpPr/>
+          <p:nvPr/>
+        </p:nvSpPr>
+        <p:spPr>
+          <a:xfrm rot="2700000">
+            <a:off x="16542812" y="5117759"/>
+            <a:ext cx="606825" cy="523125"/>
+          </a:xfrm>
+          <a:prstGeom prst="triangle">
+            <a:avLst/>
+          </a:prstGeom>
+          <a:solidFill>
+            <a:srgbClr val="F7AD2C"/>
+          </a:solidFill>
+          <a:ln>
+            <a:noFill/>
+          </a:ln>
+        </p:spPr>
+        <p:style>
+          <a:lnRef idx="2">
+            <a:schemeClr val="accent1">
+              <a:shade val="15000"/>
+            </a:schemeClr>
+          </a:lnRef>
+          <a:fillRef idx="1">
+            <a:schemeClr val="accent1"/>
+          </a:fillRef>
+          <a:effectRef idx="0">
+            <a:schemeClr val="accent1"/>
+          </a:effectRef>
+          <a:fontRef idx="minor">
+            <a:schemeClr val="lt1"/>
+          </a:fontRef>
+        </p:style>
+        <p:txBody>
+          <a:bodyPr rtlCol="0" anchor="ctr"/>
+          <a:lstStyle/>
+          <a:p>
+            <a:pPr algn="ctr"/>
+            <a:endParaRPr lang="en-NL"/>
+          </a:p>
+        </p:txBody>
+      </p:sp>
+      <p:sp>
+        <p:nvSpPr>
+          <p:cNvPr id="44" name="Isosceles Triangle 43">
+            <a:extLst>
+              <a:ext uri="{FF2B5EF4-FFF2-40B4-BE49-F238E27FC236}">
+                <a16:creationId xmlns:a16="http://schemas.microsoft.com/office/drawing/2014/main" id="{BB8D59F3-8995-5D8C-0D73-F170FEE8401B}"/>
+              </a:ext>
+            </a:extLst>
+          </p:cNvPr>
+          <p:cNvSpPr/>
+          <p:nvPr/>
+        </p:nvSpPr>
+        <p:spPr>
+          <a:xfrm rot="8100000">
+            <a:off x="16542812" y="2122516"/>
+            <a:ext cx="606825" cy="523125"/>
+          </a:xfrm>
+          <a:prstGeom prst="triangle">
+            <a:avLst/>
+          </a:prstGeom>
+          <a:solidFill>
+            <a:srgbClr val="F7AD2C"/>
+          </a:solidFill>
+          <a:ln>
+            <a:noFill/>
+          </a:ln>
+        </p:spPr>
+        <p:style>
+          <a:lnRef idx="2">
+            <a:schemeClr val="accent1">
+              <a:shade val="15000"/>
+            </a:schemeClr>
+          </a:lnRef>
+          <a:fillRef idx="1">
+            <a:schemeClr val="accent1"/>
+          </a:fillRef>
+          <a:effectRef idx="0">
+            <a:schemeClr val="accent1"/>
+          </a:effectRef>
+          <a:fontRef idx="minor">
+            <a:schemeClr val="lt1"/>
+          </a:fontRef>
+        </p:style>
+        <p:txBody>
+          <a:bodyPr rtlCol="0" anchor="ctr"/>
+          <a:lstStyle/>
+          <a:p>
+            <a:pPr algn="ctr"/>
+            <a:endParaRPr lang="en-NL"/>
+          </a:p>
+        </p:txBody>
+      </p:sp>
+      <p:sp>
+        <p:nvSpPr>
+          <p:cNvPr id="45" name="Isosceles Triangle 44">
+            <a:extLst>
+              <a:ext uri="{FF2B5EF4-FFF2-40B4-BE49-F238E27FC236}">
+                <a16:creationId xmlns:a16="http://schemas.microsoft.com/office/drawing/2014/main" id="{CFED8302-A948-7158-3DE5-F3F9FCD8E2F3}"/>
+              </a:ext>
+            </a:extLst>
+          </p:cNvPr>
+          <p:cNvSpPr/>
+          <p:nvPr/>
+        </p:nvSpPr>
+        <p:spPr>
+          <a:xfrm rot="8100000">
+            <a:off x="8049207" y="5117759"/>
+            <a:ext cx="606825" cy="523125"/>
+          </a:xfrm>
+          <a:prstGeom prst="triangle">
+            <a:avLst/>
+          </a:prstGeom>
+          <a:solidFill>
+            <a:srgbClr val="F7AD2C"/>
+          </a:solidFill>
+          <a:ln>
+            <a:noFill/>
+          </a:ln>
+        </p:spPr>
+        <p:style>
+          <a:lnRef idx="2">
+            <a:schemeClr val="accent1">
+              <a:shade val="15000"/>
+            </a:schemeClr>
+          </a:lnRef>
+          <a:fillRef idx="1">
+            <a:schemeClr val="accent1"/>
+          </a:fillRef>
+          <a:effectRef idx="0">
+            <a:schemeClr val="accent1"/>
+          </a:effectRef>
+          <a:fontRef idx="minor">
+            <a:schemeClr val="lt1"/>
+          </a:fontRef>
+        </p:style>
+        <p:txBody>
+          <a:bodyPr rtlCol="0" anchor="ctr"/>
+          <a:lstStyle/>
+          <a:p>
+            <a:pPr algn="ctr"/>
+            <a:endParaRPr lang="en-NL"/>
+          </a:p>
+        </p:txBody>
+      </p:sp>
+      <p:sp>
+        <p:nvSpPr>
+          <p:cNvPr id="46" name="Isosceles Triangle 45">
+            <a:extLst>
+              <a:ext uri="{FF2B5EF4-FFF2-40B4-BE49-F238E27FC236}">
+                <a16:creationId xmlns:a16="http://schemas.microsoft.com/office/drawing/2014/main" id="{1F537731-86BF-31DC-E1F4-6FD843067123}"/>
+              </a:ext>
+            </a:extLst>
+          </p:cNvPr>
+          <p:cNvSpPr/>
+          <p:nvPr/>
+        </p:nvSpPr>
+        <p:spPr>
+          <a:xfrm rot="8100000">
+            <a:off x="10797109" y="2122516"/>
+            <a:ext cx="606825" cy="523125"/>
+          </a:xfrm>
+          <a:prstGeom prst="triangle">
+            <a:avLst/>
+          </a:prstGeom>
+          <a:solidFill>
+            <a:srgbClr val="F7AD2C"/>
+          </a:solidFill>
+          <a:ln>
+            <a:noFill/>
+          </a:ln>
+        </p:spPr>
+        <p:style>
+          <a:lnRef idx="2">
+            <a:schemeClr val="accent1">
+              <a:shade val="15000"/>
+            </a:schemeClr>
+          </a:lnRef>
+          <a:fillRef idx="1">
+            <a:schemeClr val="accent1"/>
+          </a:fillRef>
+          <a:effectRef idx="0">
+            <a:schemeClr val="accent1"/>
+          </a:effectRef>
+          <a:fontRef idx="minor">
+            <a:schemeClr val="lt1"/>
+          </a:fontRef>
+        </p:style>
+        <p:txBody>
+          <a:bodyPr rtlCol="0" anchor="ctr"/>
+          <a:lstStyle/>
+          <a:p>
+            <a:pPr algn="ctr"/>
+            <a:endParaRPr lang="en-NL"/>
+          </a:p>
+        </p:txBody>
+      </p:sp>
+      <p:sp>
+        <p:nvSpPr>
+          <p:cNvPr id="47" name="Isosceles Triangle 46">
+            <a:extLst>
+              <a:ext uri="{FF2B5EF4-FFF2-40B4-BE49-F238E27FC236}">
+                <a16:creationId xmlns:a16="http://schemas.microsoft.com/office/drawing/2014/main" id="{637C623E-CFD6-FE85-0073-22EFC81FAB1C}"/>
+              </a:ext>
+            </a:extLst>
+          </p:cNvPr>
+          <p:cNvSpPr/>
+          <p:nvPr/>
+        </p:nvSpPr>
+        <p:spPr>
+          <a:xfrm rot="8100000">
+            <a:off x="13783140" y="5117759"/>
+            <a:ext cx="606825" cy="523125"/>
+          </a:xfrm>
+          <a:prstGeom prst="triangle">
+            <a:avLst/>
+          </a:prstGeom>
+          <a:solidFill>
+            <a:srgbClr val="F7AD2C"/>
+          </a:solidFill>
+          <a:ln>
+            <a:noFill/>
+          </a:ln>
+        </p:spPr>
+        <p:style>
+          <a:lnRef idx="2">
+            <a:schemeClr val="accent1">
+              <a:shade val="15000"/>
+            </a:schemeClr>
+          </a:lnRef>
+          <a:fillRef idx="1">
+            <a:schemeClr val="accent1"/>
+          </a:fillRef>
+          <a:effectRef idx="0">
+            <a:schemeClr val="accent1"/>
+          </a:effectRef>
+          <a:fontRef idx="minor">
+            <a:schemeClr val="lt1"/>
+          </a:fontRef>
+        </p:style>
+        <p:txBody>
+          <a:bodyPr rtlCol="0" anchor="ctr"/>
+          <a:lstStyle/>
+          <a:p>
+            <a:pPr algn="ctr"/>
+            <a:endParaRPr lang="en-NL"/>
+          </a:p>
+        </p:txBody>
+      </p:sp>
+    </p:spTree>
+    <p:extLst>
+      <p:ext uri="{BB962C8B-B14F-4D97-AF65-F5344CB8AC3E}">
+        <p14:creationId xmlns:p14="http://schemas.microsoft.com/office/powerpoint/2010/main" val="1701518198"/>
       </p:ext>
     </p:extLst>
   </p:cSld>

</xml_diff>